<commit_message>
Adicionando arquivos da terceira aula
</commit_message>
<xml_diff>
--- a/AulasReact.pptx
+++ b/AulasReact.pptx
@@ -9,34 +9,38 @@
     <p:sldId id="261" r:id="rId3"/>
     <p:sldId id="262" r:id="rId4"/>
     <p:sldId id="263" r:id="rId5"/>
-    <p:sldId id="269" r:id="rId6"/>
-    <p:sldId id="270" r:id="rId7"/>
-    <p:sldId id="271" r:id="rId8"/>
-    <p:sldId id="272" r:id="rId9"/>
-    <p:sldId id="274" r:id="rId10"/>
-    <p:sldId id="273" r:id="rId11"/>
-    <p:sldId id="275" r:id="rId12"/>
-    <p:sldId id="276" r:id="rId13"/>
-    <p:sldId id="277" r:id="rId14"/>
-    <p:sldId id="278" r:id="rId15"/>
-    <p:sldId id="279" r:id="rId16"/>
-    <p:sldId id="280" r:id="rId17"/>
-    <p:sldId id="281" r:id="rId18"/>
-    <p:sldId id="282" r:id="rId19"/>
-    <p:sldId id="283" r:id="rId20"/>
-    <p:sldId id="258" r:id="rId21"/>
-    <p:sldId id="257" r:id="rId22"/>
-    <p:sldId id="264" r:id="rId23"/>
-    <p:sldId id="265" r:id="rId24"/>
-    <p:sldId id="266" r:id="rId25"/>
-    <p:sldId id="267" r:id="rId26"/>
-    <p:sldId id="268" r:id="rId27"/>
-    <p:sldId id="259" r:id="rId28"/>
-    <p:sldId id="260" r:id="rId29"/>
-    <p:sldId id="284" r:id="rId30"/>
-    <p:sldId id="286" r:id="rId31"/>
-    <p:sldId id="285" r:id="rId32"/>
-    <p:sldId id="287" r:id="rId33"/>
+    <p:sldId id="288" r:id="rId6"/>
+    <p:sldId id="269" r:id="rId7"/>
+    <p:sldId id="270" r:id="rId8"/>
+    <p:sldId id="271" r:id="rId9"/>
+    <p:sldId id="272" r:id="rId10"/>
+    <p:sldId id="274" r:id="rId11"/>
+    <p:sldId id="273" r:id="rId12"/>
+    <p:sldId id="275" r:id="rId13"/>
+    <p:sldId id="276" r:id="rId14"/>
+    <p:sldId id="277" r:id="rId15"/>
+    <p:sldId id="278" r:id="rId16"/>
+    <p:sldId id="279" r:id="rId17"/>
+    <p:sldId id="280" r:id="rId18"/>
+    <p:sldId id="281" r:id="rId19"/>
+    <p:sldId id="282" r:id="rId20"/>
+    <p:sldId id="283" r:id="rId21"/>
+    <p:sldId id="258" r:id="rId22"/>
+    <p:sldId id="257" r:id="rId23"/>
+    <p:sldId id="264" r:id="rId24"/>
+    <p:sldId id="265" r:id="rId25"/>
+    <p:sldId id="266" r:id="rId26"/>
+    <p:sldId id="267" r:id="rId27"/>
+    <p:sldId id="268" r:id="rId28"/>
+    <p:sldId id="259" r:id="rId29"/>
+    <p:sldId id="260" r:id="rId30"/>
+    <p:sldId id="284" r:id="rId31"/>
+    <p:sldId id="286" r:id="rId32"/>
+    <p:sldId id="285" r:id="rId33"/>
+    <p:sldId id="287" r:id="rId34"/>
+    <p:sldId id="289" r:id="rId35"/>
+    <p:sldId id="290" r:id="rId36"/>
+    <p:sldId id="291" r:id="rId37"/>
   </p:sldIdLst>
   <p:sldSz cx="12192000" cy="6858000"/>
   <p:notesSz cx="6858000" cy="9144000"/>
@@ -290,7 +294,7 @@
           <a:p>
             <a:fld id="{4D798FAC-3F87-4A38-AC8D-ED7734BBC1D3}" type="datetimeFigureOut">
               <a:rPr lang="pt-BR" smtClean="0"/>
-              <a:t>05/07/2022</a:t>
+              <a:t>07/07/2022</a:t>
             </a:fld>
             <a:endParaRPr lang="pt-BR"/>
           </a:p>
@@ -488,7 +492,7 @@
           <a:p>
             <a:fld id="{4D798FAC-3F87-4A38-AC8D-ED7734BBC1D3}" type="datetimeFigureOut">
               <a:rPr lang="pt-BR" smtClean="0"/>
-              <a:t>05/07/2022</a:t>
+              <a:t>07/07/2022</a:t>
             </a:fld>
             <a:endParaRPr lang="pt-BR"/>
           </a:p>
@@ -696,7 +700,7 @@
           <a:p>
             <a:fld id="{4D798FAC-3F87-4A38-AC8D-ED7734BBC1D3}" type="datetimeFigureOut">
               <a:rPr lang="pt-BR" smtClean="0"/>
-              <a:t>05/07/2022</a:t>
+              <a:t>07/07/2022</a:t>
             </a:fld>
             <a:endParaRPr lang="pt-BR"/>
           </a:p>
@@ -894,7 +898,7 @@
           <a:p>
             <a:fld id="{4D798FAC-3F87-4A38-AC8D-ED7734BBC1D3}" type="datetimeFigureOut">
               <a:rPr lang="pt-BR" smtClean="0"/>
-              <a:t>05/07/2022</a:t>
+              <a:t>07/07/2022</a:t>
             </a:fld>
             <a:endParaRPr lang="pt-BR"/>
           </a:p>
@@ -1169,7 +1173,7 @@
           <a:p>
             <a:fld id="{4D798FAC-3F87-4A38-AC8D-ED7734BBC1D3}" type="datetimeFigureOut">
               <a:rPr lang="pt-BR" smtClean="0"/>
-              <a:t>05/07/2022</a:t>
+              <a:t>07/07/2022</a:t>
             </a:fld>
             <a:endParaRPr lang="pt-BR"/>
           </a:p>
@@ -1434,7 +1438,7 @@
           <a:p>
             <a:fld id="{4D798FAC-3F87-4A38-AC8D-ED7734BBC1D3}" type="datetimeFigureOut">
               <a:rPr lang="pt-BR" smtClean="0"/>
-              <a:t>05/07/2022</a:t>
+              <a:t>07/07/2022</a:t>
             </a:fld>
             <a:endParaRPr lang="pt-BR"/>
           </a:p>
@@ -1846,7 +1850,7 @@
           <a:p>
             <a:fld id="{4D798FAC-3F87-4A38-AC8D-ED7734BBC1D3}" type="datetimeFigureOut">
               <a:rPr lang="pt-BR" smtClean="0"/>
-              <a:t>05/07/2022</a:t>
+              <a:t>07/07/2022</a:t>
             </a:fld>
             <a:endParaRPr lang="pt-BR"/>
           </a:p>
@@ -1987,7 +1991,7 @@
           <a:p>
             <a:fld id="{4D798FAC-3F87-4A38-AC8D-ED7734BBC1D3}" type="datetimeFigureOut">
               <a:rPr lang="pt-BR" smtClean="0"/>
-              <a:t>05/07/2022</a:t>
+              <a:t>07/07/2022</a:t>
             </a:fld>
             <a:endParaRPr lang="pt-BR"/>
           </a:p>
@@ -2100,7 +2104,7 @@
           <a:p>
             <a:fld id="{4D798FAC-3F87-4A38-AC8D-ED7734BBC1D3}" type="datetimeFigureOut">
               <a:rPr lang="pt-BR" smtClean="0"/>
-              <a:t>05/07/2022</a:t>
+              <a:t>07/07/2022</a:t>
             </a:fld>
             <a:endParaRPr lang="pt-BR"/>
           </a:p>
@@ -2411,7 +2415,7 @@
           <a:p>
             <a:fld id="{4D798FAC-3F87-4A38-AC8D-ED7734BBC1D3}" type="datetimeFigureOut">
               <a:rPr lang="pt-BR" smtClean="0"/>
-              <a:t>05/07/2022</a:t>
+              <a:t>07/07/2022</a:t>
             </a:fld>
             <a:endParaRPr lang="pt-BR"/>
           </a:p>
@@ -2699,7 +2703,7 @@
           <a:p>
             <a:fld id="{4D798FAC-3F87-4A38-AC8D-ED7734BBC1D3}" type="datetimeFigureOut">
               <a:rPr lang="pt-BR" smtClean="0"/>
-              <a:t>05/07/2022</a:t>
+              <a:t>07/07/2022</a:t>
             </a:fld>
             <a:endParaRPr lang="pt-BR"/>
           </a:p>
@@ -2940,7 +2944,7 @@
           <a:p>
             <a:fld id="{4D798FAC-3F87-4A38-AC8D-ED7734BBC1D3}" type="datetimeFigureOut">
               <a:rPr lang="pt-BR" smtClean="0"/>
-              <a:t>05/07/2022</a:t>
+              <a:t>07/07/2022</a:t>
             </a:fld>
             <a:endParaRPr lang="pt-BR"/>
           </a:p>
@@ -3479,6 +3483,143 @@
           <p:cNvPr id="2" name="Título 1">
             <a:extLst>
               <a:ext uri="{FF2B5EF4-FFF2-40B4-BE49-F238E27FC236}">
+                <a16:creationId xmlns:a16="http://schemas.microsoft.com/office/drawing/2014/main" id="{ED6213E9-706D-A58E-3A0F-65ACB1D2E1FD}"/>
+              </a:ext>
+            </a:extLst>
+          </p:cNvPr>
+          <p:cNvSpPr>
+            <a:spLocks noGrp="1"/>
+          </p:cNvSpPr>
+          <p:nvPr>
+            <p:ph type="title"/>
+          </p:nvPr>
+        </p:nvSpPr>
+        <p:spPr/>
+        <p:txBody>
+          <a:bodyPr/>
+          <a:lstStyle/>
+          <a:p>
+            <a:r>
+              <a:rPr lang="pt-BR" b="1" dirty="0">
+                <a:solidFill>
+                  <a:srgbClr val="78D1E1"/>
+                </a:solidFill>
+                <a:effectLst/>
+                <a:latin typeface="Consolas" panose="020B0609020204030204" pitchFamily="49" charset="0"/>
+              </a:rPr>
+              <a:t>Propriedades - </a:t>
+            </a:r>
+            <a:r>
+              <a:rPr lang="pt-BR" b="1" dirty="0" err="1">
+                <a:solidFill>
+                  <a:srgbClr val="78D1E1"/>
+                </a:solidFill>
+                <a:effectLst/>
+                <a:latin typeface="Consolas" panose="020B0609020204030204" pitchFamily="49" charset="0"/>
+              </a:rPr>
+              <a:t>Desistratular</a:t>
+            </a:r>
+            <a:endParaRPr lang="pt-BR" dirty="0"/>
+          </a:p>
+        </p:txBody>
+      </p:sp>
+      <p:pic>
+        <p:nvPicPr>
+          <p:cNvPr id="5" name="Imagem 4">
+            <a:extLst>
+              <a:ext uri="{FF2B5EF4-FFF2-40B4-BE49-F238E27FC236}">
+                <a16:creationId xmlns:a16="http://schemas.microsoft.com/office/drawing/2014/main" id="{6AD64006-C6CD-89FD-274B-10D3D1BF69BA}"/>
+              </a:ext>
+            </a:extLst>
+          </p:cNvPr>
+          <p:cNvPicPr>
+            <a:picLocks noChangeAspect="1"/>
+          </p:cNvPicPr>
+          <p:nvPr/>
+        </p:nvPicPr>
+        <p:blipFill>
+          <a:blip r:embed="rId2"/>
+          <a:stretch>
+            <a:fillRect/>
+          </a:stretch>
+        </p:blipFill>
+        <p:spPr>
+          <a:xfrm>
+            <a:off x="5457476" y="3401633"/>
+            <a:ext cx="5591955" cy="2676899"/>
+          </a:xfrm>
+          <a:prstGeom prst="rect">
+            <a:avLst/>
+          </a:prstGeom>
+        </p:spPr>
+      </p:pic>
+      <p:pic>
+        <p:nvPicPr>
+          <p:cNvPr id="6" name="Espaço Reservado para Conteúdo 5">
+            <a:extLst>
+              <a:ext uri="{FF2B5EF4-FFF2-40B4-BE49-F238E27FC236}">
+                <a16:creationId xmlns:a16="http://schemas.microsoft.com/office/drawing/2014/main" id="{CA7F3AC4-8B36-11E6-299A-E66356E3D528}"/>
+              </a:ext>
+            </a:extLst>
+          </p:cNvPr>
+          <p:cNvPicPr>
+            <a:picLocks noGrp="1" noChangeAspect="1"/>
+          </p:cNvPicPr>
+          <p:nvPr>
+            <p:ph idx="1"/>
+          </p:nvPr>
+        </p:nvPicPr>
+        <p:blipFill>
+          <a:blip r:embed="rId3"/>
+          <a:stretch>
+            <a:fillRect/>
+          </a:stretch>
+        </p:blipFill>
+        <p:spPr>
+          <a:xfrm>
+            <a:off x="605957" y="1690688"/>
+            <a:ext cx="4725059" cy="3248478"/>
+          </a:xfrm>
+          <a:prstGeom prst="rect">
+            <a:avLst/>
+          </a:prstGeom>
+        </p:spPr>
+      </p:pic>
+    </p:spTree>
+    <p:extLst>
+      <p:ext uri="{BB962C8B-B14F-4D97-AF65-F5344CB8AC3E}">
+        <p14:creationId xmlns:p14="http://schemas.microsoft.com/office/powerpoint/2010/main" val="3417228317"/>
+      </p:ext>
+    </p:extLst>
+  </p:cSld>
+  <p:clrMapOvr>
+    <a:masterClrMapping/>
+  </p:clrMapOvr>
+</p:sld>
+</file>
+
+<file path=ppt/slides/slide11.xml><?xml version="1.0" encoding="utf-8"?>
+<p:sld xmlns:a="http://schemas.openxmlformats.org/drawingml/2006/main" xmlns:r="http://schemas.openxmlformats.org/officeDocument/2006/relationships" xmlns:p="http://schemas.openxmlformats.org/presentationml/2006/main">
+  <p:cSld>
+    <p:spTree>
+      <p:nvGrpSpPr>
+        <p:cNvPr id="1" name=""/>
+        <p:cNvGrpSpPr/>
+        <p:nvPr/>
+      </p:nvGrpSpPr>
+      <p:grpSpPr>
+        <a:xfrm>
+          <a:off x="0" y="0"/>
+          <a:ext cx="0" cy="0"/>
+          <a:chOff x="0" y="0"/>
+          <a:chExt cx="0" cy="0"/>
+        </a:xfrm>
+      </p:grpSpPr>
+      <p:sp>
+        <p:nvSpPr>
+          <p:cNvPr id="2" name="Título 1">
+            <a:extLst>
+              <a:ext uri="{FF2B5EF4-FFF2-40B4-BE49-F238E27FC236}">
                 <a16:creationId xmlns:a16="http://schemas.microsoft.com/office/drawing/2014/main" id="{A3261D23-CB22-5B66-D8F6-FDA14F621218}"/>
               </a:ext>
             </a:extLst>
@@ -3551,7 +3692,7 @@
 </p:sld>
 </file>
 
-<file path=ppt/slides/slide11.xml><?xml version="1.0" encoding="utf-8"?>
+<file path=ppt/slides/slide12.xml><?xml version="1.0" encoding="utf-8"?>
 <p:sld xmlns:a="http://schemas.openxmlformats.org/drawingml/2006/main" xmlns:r="http://schemas.openxmlformats.org/officeDocument/2006/relationships" xmlns:p="http://schemas.openxmlformats.org/presentationml/2006/main">
   <p:cSld>
     <p:spTree>
@@ -3677,7 +3818,7 @@
 </p:sld>
 </file>
 
-<file path=ppt/slides/slide12.xml><?xml version="1.0" encoding="utf-8"?>
+<file path=ppt/slides/slide13.xml><?xml version="1.0" encoding="utf-8"?>
 <p:sld xmlns:a="http://schemas.openxmlformats.org/drawingml/2006/main" xmlns:r="http://schemas.openxmlformats.org/officeDocument/2006/relationships" xmlns:p="http://schemas.openxmlformats.org/presentationml/2006/main">
   <p:cSld>
     <p:spTree>
@@ -3771,7 +3912,7 @@
 </p:sld>
 </file>
 
-<file path=ppt/slides/slide13.xml><?xml version="1.0" encoding="utf-8"?>
+<file path=ppt/slides/slide14.xml><?xml version="1.0" encoding="utf-8"?>
 <p:sld xmlns:a="http://schemas.openxmlformats.org/drawingml/2006/main" xmlns:r="http://schemas.openxmlformats.org/officeDocument/2006/relationships" xmlns:p="http://schemas.openxmlformats.org/presentationml/2006/main">
   <p:cSld>
     <p:spTree>
@@ -3899,7 +4040,7 @@
 </p:sld>
 </file>
 
-<file path=ppt/slides/slide14.xml><?xml version="1.0" encoding="utf-8"?>
+<file path=ppt/slides/slide15.xml><?xml version="1.0" encoding="utf-8"?>
 <p:sld xmlns:a="http://schemas.openxmlformats.org/drawingml/2006/main" xmlns:r="http://schemas.openxmlformats.org/officeDocument/2006/relationships" xmlns:p="http://schemas.openxmlformats.org/presentationml/2006/main">
   <p:cSld>
     <p:spTree>
@@ -3994,7 +4135,7 @@
 </p:sld>
 </file>
 
-<file path=ppt/slides/slide15.xml><?xml version="1.0" encoding="utf-8"?>
+<file path=ppt/slides/slide16.xml><?xml version="1.0" encoding="utf-8"?>
 <p:sld xmlns:a="http://schemas.openxmlformats.org/drawingml/2006/main" xmlns:r="http://schemas.openxmlformats.org/officeDocument/2006/relationships" xmlns:p="http://schemas.openxmlformats.org/presentationml/2006/main">
   <p:cSld>
     <p:spTree>
@@ -4154,7 +4295,7 @@
 </p:sld>
 </file>
 
-<file path=ppt/slides/slide16.xml><?xml version="1.0" encoding="utf-8"?>
+<file path=ppt/slides/slide17.xml><?xml version="1.0" encoding="utf-8"?>
 <p:sld xmlns:a="http://schemas.openxmlformats.org/drawingml/2006/main" xmlns:r="http://schemas.openxmlformats.org/officeDocument/2006/relationships" xmlns:p="http://schemas.openxmlformats.org/presentationml/2006/main">
   <p:cSld>
     <p:spTree>
@@ -4263,7 +4404,7 @@
 </p:sld>
 </file>
 
-<file path=ppt/slides/slide17.xml><?xml version="1.0" encoding="utf-8"?>
+<file path=ppt/slides/slide18.xml><?xml version="1.0" encoding="utf-8"?>
 <p:sld xmlns:a="http://schemas.openxmlformats.org/drawingml/2006/main" xmlns:r="http://schemas.openxmlformats.org/officeDocument/2006/relationships" xmlns:p="http://schemas.openxmlformats.org/presentationml/2006/main">
   <p:cSld>
     <p:spTree>
@@ -4385,7 +4526,7 @@
 </p:sld>
 </file>
 
-<file path=ppt/slides/slide18.xml><?xml version="1.0" encoding="utf-8"?>
+<file path=ppt/slides/slide19.xml><?xml version="1.0" encoding="utf-8"?>
 <p:sld xmlns:a="http://schemas.openxmlformats.org/drawingml/2006/main" xmlns:r="http://schemas.openxmlformats.org/officeDocument/2006/relationships" xmlns:p="http://schemas.openxmlformats.org/presentationml/2006/main">
   <p:cSld>
     <p:spTree>
@@ -4531,7 +4672,153 @@
 </p:sld>
 </file>
 
-<file path=ppt/slides/slide19.xml><?xml version="1.0" encoding="utf-8"?>
+<file path=ppt/slides/slide2.xml><?xml version="1.0" encoding="utf-8"?>
+<p:sld xmlns:a="http://schemas.openxmlformats.org/drawingml/2006/main" xmlns:r="http://schemas.openxmlformats.org/officeDocument/2006/relationships" xmlns:p="http://schemas.openxmlformats.org/presentationml/2006/main">
+  <p:cSld>
+    <p:spTree>
+      <p:nvGrpSpPr>
+        <p:cNvPr id="1" name=""/>
+        <p:cNvGrpSpPr/>
+        <p:nvPr/>
+      </p:nvGrpSpPr>
+      <p:grpSpPr>
+        <a:xfrm>
+          <a:off x="0" y="0"/>
+          <a:ext cx="0" cy="0"/>
+          <a:chOff x="0" y="0"/>
+          <a:chExt cx="0" cy="0"/>
+        </a:xfrm>
+      </p:grpSpPr>
+      <p:sp>
+        <p:nvSpPr>
+          <p:cNvPr id="2" name="Título 1">
+            <a:extLst>
+              <a:ext uri="{FF2B5EF4-FFF2-40B4-BE49-F238E27FC236}">
+                <a16:creationId xmlns:a16="http://schemas.microsoft.com/office/drawing/2014/main" id="{11C1D114-2B5C-A56B-64A1-C28674104BC8}"/>
+              </a:ext>
+            </a:extLst>
+          </p:cNvPr>
+          <p:cNvSpPr>
+            <a:spLocks noGrp="1"/>
+          </p:cNvSpPr>
+          <p:nvPr>
+            <p:ph type="title"/>
+          </p:nvPr>
+        </p:nvSpPr>
+        <p:spPr/>
+        <p:txBody>
+          <a:bodyPr/>
+          <a:lstStyle/>
+          <a:p>
+            <a:r>
+              <a:rPr lang="pt-BR" b="1" dirty="0">
+                <a:solidFill>
+                  <a:srgbClr val="78D1E1"/>
+                </a:solidFill>
+                <a:effectLst/>
+                <a:latin typeface="Consolas" panose="020B0609020204030204" pitchFamily="49" charset="0"/>
+              </a:rPr>
+              <a:t>Primeira Aula - Ferramentas</a:t>
+            </a:r>
+            <a:endParaRPr lang="pt-BR" dirty="0"/>
+          </a:p>
+        </p:txBody>
+      </p:sp>
+      <p:sp>
+        <p:nvSpPr>
+          <p:cNvPr id="3" name="Espaço Reservado para Conteúdo 2">
+            <a:extLst>
+              <a:ext uri="{FF2B5EF4-FFF2-40B4-BE49-F238E27FC236}">
+                <a16:creationId xmlns:a16="http://schemas.microsoft.com/office/drawing/2014/main" id="{0BABB045-DEF4-399E-09A2-E7C6B70AF586}"/>
+              </a:ext>
+            </a:extLst>
+          </p:cNvPr>
+          <p:cNvSpPr>
+            <a:spLocks noGrp="1"/>
+          </p:cNvSpPr>
+          <p:nvPr>
+            <p:ph idx="1"/>
+          </p:nvPr>
+        </p:nvSpPr>
+        <p:spPr/>
+        <p:txBody>
+          <a:bodyPr/>
+          <a:lstStyle/>
+          <a:p>
+            <a:r>
+              <a:rPr lang="pt-BR" b="0" dirty="0" err="1">
+                <a:effectLst/>
+                <a:latin typeface="Consolas" panose="020B0609020204030204" pitchFamily="49" charset="0"/>
+              </a:rPr>
+              <a:t>npm</a:t>
+            </a:r>
+            <a:r>
+              <a:rPr lang="pt-BR" b="0" dirty="0">
+                <a:effectLst/>
+                <a:latin typeface="Consolas" panose="020B0609020204030204" pitchFamily="49" charset="0"/>
+              </a:rPr>
+              <a:t> </a:t>
+            </a:r>
+            <a:r>
+              <a:rPr lang="pt-BR" b="0" dirty="0" err="1">
+                <a:effectLst/>
+                <a:latin typeface="Consolas" panose="020B0609020204030204" pitchFamily="49" charset="0"/>
+              </a:rPr>
+              <a:t>create</a:t>
+            </a:r>
+            <a:r>
+              <a:rPr lang="pt-BR" b="0" dirty="0">
+                <a:effectLst/>
+                <a:latin typeface="Consolas" panose="020B0609020204030204" pitchFamily="49" charset="0"/>
+              </a:rPr>
+              <a:t> </a:t>
+            </a:r>
+            <a:r>
+              <a:rPr lang="pt-BR" b="0" dirty="0" err="1">
+                <a:effectLst/>
+                <a:latin typeface="Consolas" panose="020B0609020204030204" pitchFamily="49" charset="0"/>
+              </a:rPr>
+              <a:t>vite@latest</a:t>
+            </a:r>
+            <a:r>
+              <a:rPr lang="pt-BR" b="0" dirty="0">
+                <a:effectLst/>
+                <a:latin typeface="Consolas" panose="020B0609020204030204" pitchFamily="49" charset="0"/>
+              </a:rPr>
+              <a:t> </a:t>
+            </a:r>
+          </a:p>
+          <a:p>
+            <a:pPr marL="0" indent="0">
+              <a:buNone/>
+            </a:pPr>
+            <a:r>
+              <a:rPr lang="pt-BR" b="0" dirty="0">
+                <a:effectLst/>
+                <a:latin typeface="Consolas" panose="020B0609020204030204" pitchFamily="49" charset="0"/>
+              </a:rPr>
+              <a:t>	É uma ferramenta de construção que visa fornecer uma experiência de desenvolvimento mais rápida e enxuta para projetos web modernos, possui servidor. </a:t>
+            </a:r>
+          </a:p>
+          <a:p>
+            <a:endParaRPr lang="pt-BR" dirty="0"/>
+          </a:p>
+        </p:txBody>
+      </p:sp>
+    </p:spTree>
+    <p:extLst>
+      <p:ext uri="{BB962C8B-B14F-4D97-AF65-F5344CB8AC3E}">
+        <p14:creationId xmlns:p14="http://schemas.microsoft.com/office/powerpoint/2010/main" val="1982444760"/>
+      </p:ext>
+    </p:extLst>
+  </p:cSld>
+  <p:clrMapOvr>
+    <a:masterClrMapping/>
+  </p:clrMapOvr>
+</p:sld>
+</file>
+
+<file path=ppt/slides/slide20.xml><?xml version="1.0" encoding="utf-8"?>
 <p:sld xmlns:a="http://schemas.openxmlformats.org/drawingml/2006/main" xmlns:r="http://schemas.openxmlformats.org/officeDocument/2006/relationships" xmlns:p="http://schemas.openxmlformats.org/presentationml/2006/main">
   <p:cSld>
     <p:spTree>
@@ -4699,153 +4986,7 @@
 </p:sld>
 </file>
 
-<file path=ppt/slides/slide2.xml><?xml version="1.0" encoding="utf-8"?>
-<p:sld xmlns:a="http://schemas.openxmlformats.org/drawingml/2006/main" xmlns:r="http://schemas.openxmlformats.org/officeDocument/2006/relationships" xmlns:p="http://schemas.openxmlformats.org/presentationml/2006/main">
-  <p:cSld>
-    <p:spTree>
-      <p:nvGrpSpPr>
-        <p:cNvPr id="1" name=""/>
-        <p:cNvGrpSpPr/>
-        <p:nvPr/>
-      </p:nvGrpSpPr>
-      <p:grpSpPr>
-        <a:xfrm>
-          <a:off x="0" y="0"/>
-          <a:ext cx="0" cy="0"/>
-          <a:chOff x="0" y="0"/>
-          <a:chExt cx="0" cy="0"/>
-        </a:xfrm>
-      </p:grpSpPr>
-      <p:sp>
-        <p:nvSpPr>
-          <p:cNvPr id="2" name="Título 1">
-            <a:extLst>
-              <a:ext uri="{FF2B5EF4-FFF2-40B4-BE49-F238E27FC236}">
-                <a16:creationId xmlns:a16="http://schemas.microsoft.com/office/drawing/2014/main" id="{11C1D114-2B5C-A56B-64A1-C28674104BC8}"/>
-              </a:ext>
-            </a:extLst>
-          </p:cNvPr>
-          <p:cNvSpPr>
-            <a:spLocks noGrp="1"/>
-          </p:cNvSpPr>
-          <p:nvPr>
-            <p:ph type="title"/>
-          </p:nvPr>
-        </p:nvSpPr>
-        <p:spPr/>
-        <p:txBody>
-          <a:bodyPr/>
-          <a:lstStyle/>
-          <a:p>
-            <a:r>
-              <a:rPr lang="pt-BR" b="1" dirty="0">
-                <a:solidFill>
-                  <a:srgbClr val="78D1E1"/>
-                </a:solidFill>
-                <a:effectLst/>
-                <a:latin typeface="Consolas" panose="020B0609020204030204" pitchFamily="49" charset="0"/>
-              </a:rPr>
-              <a:t>Primeira Aula - Ferramentas</a:t>
-            </a:r>
-            <a:endParaRPr lang="pt-BR" dirty="0"/>
-          </a:p>
-        </p:txBody>
-      </p:sp>
-      <p:sp>
-        <p:nvSpPr>
-          <p:cNvPr id="3" name="Espaço Reservado para Conteúdo 2">
-            <a:extLst>
-              <a:ext uri="{FF2B5EF4-FFF2-40B4-BE49-F238E27FC236}">
-                <a16:creationId xmlns:a16="http://schemas.microsoft.com/office/drawing/2014/main" id="{0BABB045-DEF4-399E-09A2-E7C6B70AF586}"/>
-              </a:ext>
-            </a:extLst>
-          </p:cNvPr>
-          <p:cNvSpPr>
-            <a:spLocks noGrp="1"/>
-          </p:cNvSpPr>
-          <p:nvPr>
-            <p:ph idx="1"/>
-          </p:nvPr>
-        </p:nvSpPr>
-        <p:spPr/>
-        <p:txBody>
-          <a:bodyPr/>
-          <a:lstStyle/>
-          <a:p>
-            <a:r>
-              <a:rPr lang="pt-BR" b="0" dirty="0" err="1">
-                <a:effectLst/>
-                <a:latin typeface="Consolas" panose="020B0609020204030204" pitchFamily="49" charset="0"/>
-              </a:rPr>
-              <a:t>npm</a:t>
-            </a:r>
-            <a:r>
-              <a:rPr lang="pt-BR" b="0" dirty="0">
-                <a:effectLst/>
-                <a:latin typeface="Consolas" panose="020B0609020204030204" pitchFamily="49" charset="0"/>
-              </a:rPr>
-              <a:t> </a:t>
-            </a:r>
-            <a:r>
-              <a:rPr lang="pt-BR" b="0" dirty="0" err="1">
-                <a:effectLst/>
-                <a:latin typeface="Consolas" panose="020B0609020204030204" pitchFamily="49" charset="0"/>
-              </a:rPr>
-              <a:t>create</a:t>
-            </a:r>
-            <a:r>
-              <a:rPr lang="pt-BR" b="0" dirty="0">
-                <a:effectLst/>
-                <a:latin typeface="Consolas" panose="020B0609020204030204" pitchFamily="49" charset="0"/>
-              </a:rPr>
-              <a:t> </a:t>
-            </a:r>
-            <a:r>
-              <a:rPr lang="pt-BR" b="0" dirty="0" err="1">
-                <a:effectLst/>
-                <a:latin typeface="Consolas" panose="020B0609020204030204" pitchFamily="49" charset="0"/>
-              </a:rPr>
-              <a:t>vite@latest</a:t>
-            </a:r>
-            <a:r>
-              <a:rPr lang="pt-BR" b="0" dirty="0">
-                <a:effectLst/>
-                <a:latin typeface="Consolas" panose="020B0609020204030204" pitchFamily="49" charset="0"/>
-              </a:rPr>
-              <a:t> </a:t>
-            </a:r>
-          </a:p>
-          <a:p>
-            <a:pPr marL="0" indent="0">
-              <a:buNone/>
-            </a:pPr>
-            <a:r>
-              <a:rPr lang="pt-BR" b="0" dirty="0">
-                <a:effectLst/>
-                <a:latin typeface="Consolas" panose="020B0609020204030204" pitchFamily="49" charset="0"/>
-              </a:rPr>
-              <a:t>	É uma ferramenta de construção que visa fornecer uma experiência de desenvolvimento mais rápida e enxuta para projetos web modernos, possui servidor. </a:t>
-            </a:r>
-          </a:p>
-          <a:p>
-            <a:endParaRPr lang="pt-BR" dirty="0"/>
-          </a:p>
-        </p:txBody>
-      </p:sp>
-    </p:spTree>
-    <p:extLst>
-      <p:ext uri="{BB962C8B-B14F-4D97-AF65-F5344CB8AC3E}">
-        <p14:creationId xmlns:p14="http://schemas.microsoft.com/office/powerpoint/2010/main" val="1982444760"/>
-      </p:ext>
-    </p:extLst>
-  </p:cSld>
-  <p:clrMapOvr>
-    <a:masterClrMapping/>
-  </p:clrMapOvr>
-</p:sld>
-</file>
-
-<file path=ppt/slides/slide20.xml><?xml version="1.0" encoding="utf-8"?>
+<file path=ppt/slides/slide21.xml><?xml version="1.0" encoding="utf-8"?>
 <p:sld xmlns:a="http://schemas.openxmlformats.org/drawingml/2006/main" xmlns:r="http://schemas.openxmlformats.org/officeDocument/2006/relationships" xmlns:p="http://schemas.openxmlformats.org/presentationml/2006/main">
   <p:cSld>
     <p:spTree>
@@ -4979,7 +5120,7 @@
 </p:sld>
 </file>
 
-<file path=ppt/slides/slide21.xml><?xml version="1.0" encoding="utf-8"?>
+<file path=ppt/slides/slide22.xml><?xml version="1.0" encoding="utf-8"?>
 <p:sld xmlns:a="http://schemas.openxmlformats.org/drawingml/2006/main" xmlns:r="http://schemas.openxmlformats.org/officeDocument/2006/relationships" xmlns:p="http://schemas.openxmlformats.org/presentationml/2006/main">
   <p:cSld>
     <p:spTree>
@@ -5073,191 +5214,6 @@
 </p:sld>
 </file>
 
-<file path=ppt/slides/slide22.xml><?xml version="1.0" encoding="utf-8"?>
-<p:sld xmlns:a="http://schemas.openxmlformats.org/drawingml/2006/main" xmlns:r="http://schemas.openxmlformats.org/officeDocument/2006/relationships" xmlns:p="http://schemas.openxmlformats.org/presentationml/2006/main">
-  <p:cSld>
-    <p:spTree>
-      <p:nvGrpSpPr>
-        <p:cNvPr id="1" name=""/>
-        <p:cNvGrpSpPr/>
-        <p:nvPr/>
-      </p:nvGrpSpPr>
-      <p:grpSpPr>
-        <a:xfrm>
-          <a:off x="0" y="0"/>
-          <a:ext cx="0" cy="0"/>
-          <a:chOff x="0" y="0"/>
-          <a:chExt cx="0" cy="0"/>
-        </a:xfrm>
-      </p:grpSpPr>
-      <p:sp>
-        <p:nvSpPr>
-          <p:cNvPr id="2" name="Título 1">
-            <a:extLst>
-              <a:ext uri="{FF2B5EF4-FFF2-40B4-BE49-F238E27FC236}">
-                <a16:creationId xmlns:a16="http://schemas.microsoft.com/office/drawing/2014/main" id="{43EA1F88-6380-5A3D-0E64-CB7C5D49B8D2}"/>
-              </a:ext>
-            </a:extLst>
-          </p:cNvPr>
-          <p:cNvSpPr>
-            <a:spLocks noGrp="1"/>
-          </p:cNvSpPr>
-          <p:nvPr>
-            <p:ph type="title"/>
-          </p:nvPr>
-        </p:nvSpPr>
-        <p:spPr/>
-        <p:txBody>
-          <a:bodyPr/>
-          <a:lstStyle/>
-          <a:p>
-            <a:r>
-              <a:rPr lang="pt-BR" b="1" dirty="0">
-                <a:solidFill>
-                  <a:srgbClr val="78D1E1"/>
-                </a:solidFill>
-                <a:effectLst/>
-                <a:latin typeface="Consolas" panose="020B0609020204030204" pitchFamily="49" charset="0"/>
-              </a:rPr>
-              <a:t>Primeira Aula - CMS</a:t>
-            </a:r>
-            <a:endParaRPr lang="pt-BR" dirty="0"/>
-          </a:p>
-        </p:txBody>
-      </p:sp>
-      <p:sp>
-        <p:nvSpPr>
-          <p:cNvPr id="3" name="Espaço Reservado para Conteúdo 2">
-            <a:extLst>
-              <a:ext uri="{FF2B5EF4-FFF2-40B4-BE49-F238E27FC236}">
-                <a16:creationId xmlns:a16="http://schemas.microsoft.com/office/drawing/2014/main" id="{433855CC-BC8F-879E-69A2-6A4EEDFD6EEF}"/>
-              </a:ext>
-            </a:extLst>
-          </p:cNvPr>
-          <p:cNvSpPr>
-            <a:spLocks noGrp="1"/>
-          </p:cNvSpPr>
-          <p:nvPr>
-            <p:ph idx="1"/>
-          </p:nvPr>
-        </p:nvSpPr>
-        <p:spPr/>
-        <p:txBody>
-          <a:bodyPr>
-            <a:normAutofit fontScale="92500"/>
-          </a:bodyPr>
-          <a:lstStyle/>
-          <a:p>
-            <a:r>
-              <a:rPr lang="pt-BR" b="0" dirty="0">
-                <a:effectLst/>
-                <a:latin typeface="Consolas" panose="020B0609020204030204" pitchFamily="49" charset="0"/>
-              </a:rPr>
-              <a:t>CMS = </a:t>
-            </a:r>
-            <a:r>
-              <a:rPr lang="pt-BR" b="0" dirty="0" err="1">
-                <a:effectLst/>
-                <a:latin typeface="Consolas" panose="020B0609020204030204" pitchFamily="49" charset="0"/>
-              </a:rPr>
-              <a:t>Content</a:t>
-            </a:r>
-            <a:r>
-              <a:rPr lang="pt-BR" b="0" dirty="0">
-                <a:effectLst/>
-                <a:latin typeface="Consolas" panose="020B0609020204030204" pitchFamily="49" charset="0"/>
-              </a:rPr>
-              <a:t> Management System</a:t>
-            </a:r>
-          </a:p>
-          <a:p>
-            <a:pPr algn="just"/>
-            <a:r>
-              <a:rPr lang="pt-BR" b="0" dirty="0">
-                <a:effectLst/>
-                <a:latin typeface="Consolas" panose="020B0609020204030204" pitchFamily="49" charset="0"/>
-              </a:rPr>
-              <a:t>   É um software executado no navegador permite que você crie, gerencie e modifique um website e seu conteúdo sem a necessidade de conhecimento de programação.</a:t>
-            </a:r>
-          </a:p>
-          <a:p>
-            <a:pPr marL="0" indent="0" algn="just">
-              <a:buNone/>
-            </a:pPr>
-            <a:br>
-              <a:rPr lang="pt-BR" b="0" dirty="0">
-                <a:effectLst/>
-                <a:latin typeface="Consolas" panose="020B0609020204030204" pitchFamily="49" charset="0"/>
-              </a:rPr>
-            </a:br>
-            <a:r>
-              <a:rPr lang="pt-BR" b="0" dirty="0">
-                <a:effectLst/>
-                <a:latin typeface="Consolas" panose="020B0609020204030204" pitchFamily="49" charset="0"/>
-              </a:rPr>
-              <a:t>    Assim sendo, ele possui uma interface gráfica para ajudar no gerenciamento de todos os aspectos do seu site. Você pode criar e editar conteúdos, adicionar imagens e vídeos, e montar o layout do site. </a:t>
-            </a:r>
-            <a:r>
-              <a:rPr lang="pt-BR" b="0" dirty="0" err="1">
-                <a:effectLst/>
-                <a:latin typeface="Consolas" panose="020B0609020204030204" pitchFamily="49" charset="0"/>
-              </a:rPr>
-              <a:t>WordPress</a:t>
-            </a:r>
-            <a:r>
-              <a:rPr lang="pt-BR" b="0" dirty="0">
-                <a:effectLst/>
-                <a:latin typeface="Consolas" panose="020B0609020204030204" pitchFamily="49" charset="0"/>
-              </a:rPr>
-              <a:t>, </a:t>
-            </a:r>
-            <a:r>
-              <a:rPr lang="pt-BR" b="0" dirty="0" err="1">
-                <a:effectLst/>
-                <a:latin typeface="Consolas" panose="020B0609020204030204" pitchFamily="49" charset="0"/>
-              </a:rPr>
-              <a:t>Magento</a:t>
-            </a:r>
-            <a:r>
-              <a:rPr lang="pt-BR" b="0" dirty="0">
-                <a:effectLst/>
-                <a:latin typeface="Consolas" panose="020B0609020204030204" pitchFamily="49" charset="0"/>
-              </a:rPr>
-              <a:t>, e </a:t>
-            </a:r>
-            <a:r>
-              <a:rPr lang="pt-BR" b="0" dirty="0" err="1">
-                <a:effectLst/>
-                <a:latin typeface="Consolas" panose="020B0609020204030204" pitchFamily="49" charset="0"/>
-              </a:rPr>
-              <a:t>Drupal</a:t>
-            </a:r>
-            <a:r>
-              <a:rPr lang="pt-BR" b="0" dirty="0">
-                <a:effectLst/>
-                <a:latin typeface="Consolas" panose="020B0609020204030204" pitchFamily="49" charset="0"/>
-              </a:rPr>
-              <a:t> são alguns dos CMS mais populares do mercado.</a:t>
-            </a:r>
-          </a:p>
-          <a:p>
-            <a:endParaRPr lang="pt-BR" dirty="0"/>
-          </a:p>
-        </p:txBody>
-      </p:sp>
-    </p:spTree>
-    <p:extLst>
-      <p:ext uri="{BB962C8B-B14F-4D97-AF65-F5344CB8AC3E}">
-        <p14:creationId xmlns:p14="http://schemas.microsoft.com/office/powerpoint/2010/main" val="46020609"/>
-      </p:ext>
-    </p:extLst>
-  </p:cSld>
-  <p:clrMapOvr>
-    <a:masterClrMapping/>
-  </p:clrMapOvr>
-</p:sld>
-</file>
-
 <file path=ppt/slides/slide23.xml><?xml version="1.0" encoding="utf-8"?>
 <p:sld xmlns:a="http://schemas.openxmlformats.org/drawingml/2006/main" xmlns:r="http://schemas.openxmlformats.org/officeDocument/2006/relationships" xmlns:p="http://schemas.openxmlformats.org/presentationml/2006/main">
   <p:cSld>
@@ -5280,7 +5236,7 @@
           <p:cNvPr id="2" name="Título 1">
             <a:extLst>
               <a:ext uri="{FF2B5EF4-FFF2-40B4-BE49-F238E27FC236}">
-                <a16:creationId xmlns:a16="http://schemas.microsoft.com/office/drawing/2014/main" id="{7E3C4FE2-5D84-867C-7AF8-EDAF6B0E2FA4}"/>
+                <a16:creationId xmlns:a16="http://schemas.microsoft.com/office/drawing/2014/main" id="{43EA1F88-6380-5A3D-0E64-CB7C5D49B8D2}"/>
               </a:ext>
             </a:extLst>
           </p:cNvPr>
@@ -5315,7 +5271,7 @@
           <p:cNvPr id="3" name="Espaço Reservado para Conteúdo 2">
             <a:extLst>
               <a:ext uri="{FF2B5EF4-FFF2-40B4-BE49-F238E27FC236}">
-                <a16:creationId xmlns:a16="http://schemas.microsoft.com/office/drawing/2014/main" id="{02F8A83D-D14D-FC5E-688F-7041ECB18A0C}"/>
+                <a16:creationId xmlns:a16="http://schemas.microsoft.com/office/drawing/2014/main" id="{433855CC-BC8F-879E-69A2-6A4EEDFD6EEF}"/>
               </a:ext>
             </a:extLst>
           </p:cNvPr>
@@ -5328,7 +5284,9 @@
         </p:nvSpPr>
         <p:spPr/>
         <p:txBody>
-          <a:bodyPr/>
+          <a:bodyPr>
+            <a:normAutofit fontScale="92500"/>
+          </a:bodyPr>
           <a:lstStyle/>
           <a:p>
             <a:r>
@@ -5336,109 +5294,92 @@
                 <a:effectLst/>
                 <a:latin typeface="Consolas" panose="020B0609020204030204" pitchFamily="49" charset="0"/>
               </a:rPr>
-              <a:t>Traz tanto o painel de ADMIN tanto quanto a parte visual do front-</a:t>
+              <a:t>CMS = </a:t>
             </a:r>
             <a:r>
               <a:rPr lang="pt-BR" b="0" dirty="0" err="1">
                 <a:effectLst/>
                 <a:latin typeface="Consolas" panose="020B0609020204030204" pitchFamily="49" charset="0"/>
               </a:rPr>
-              <a:t>end</a:t>
+              <a:t>Content</a:t>
             </a:r>
             <a:r>
               <a:rPr lang="pt-BR" b="0" dirty="0">
                 <a:effectLst/>
                 <a:latin typeface="Consolas" panose="020B0609020204030204" pitchFamily="49" charset="0"/>
               </a:rPr>
-              <a:t> (temas)</a:t>
-            </a:r>
-          </a:p>
-          <a:p>
+              <a:t> Management System</a:t>
+            </a:r>
+          </a:p>
+          <a:p>
+            <a:pPr algn="just"/>
+            <a:r>
+              <a:rPr lang="pt-BR" b="0" dirty="0">
+                <a:effectLst/>
+                <a:latin typeface="Consolas" panose="020B0609020204030204" pitchFamily="49" charset="0"/>
+              </a:rPr>
+              <a:t>   É um software executado no navegador permite que você crie, gerencie e modifique um website e seu conteúdo sem a necessidade de conhecimento de programação.</a:t>
+            </a:r>
+          </a:p>
+          <a:p>
+            <a:pPr marL="0" indent="0" algn="just">
+              <a:buNone/>
+            </a:pPr>
+            <a:br>
+              <a:rPr lang="pt-BR" b="0" dirty="0">
+                <a:effectLst/>
+                <a:latin typeface="Consolas" panose="020B0609020204030204" pitchFamily="49" charset="0"/>
+              </a:rPr>
+            </a:br>
+            <a:r>
+              <a:rPr lang="pt-BR" b="0" dirty="0">
+                <a:effectLst/>
+                <a:latin typeface="Consolas" panose="020B0609020204030204" pitchFamily="49" charset="0"/>
+              </a:rPr>
+              <a:t>    Assim sendo, ele possui uma interface gráfica para ajudar no gerenciamento de todos os aspectos do seu site. Você pode criar e editar conteúdos, adicionar imagens e vídeos, e montar o layout do site. </a:t>
+            </a:r>
             <a:r>
               <a:rPr lang="pt-BR" b="0" dirty="0" err="1">
                 <a:effectLst/>
                 <a:latin typeface="Consolas" panose="020B0609020204030204" pitchFamily="49" charset="0"/>
               </a:rPr>
-              <a:t>Headless</a:t>
+              <a:t>WordPress</a:t>
             </a:r>
             <a:r>
               <a:rPr lang="pt-BR" b="0" dirty="0">
                 <a:effectLst/>
                 <a:latin typeface="Consolas" panose="020B0609020204030204" pitchFamily="49" charset="0"/>
               </a:rPr>
-              <a:t> CMS (</a:t>
+              <a:t>, </a:t>
             </a:r>
             <a:r>
               <a:rPr lang="pt-BR" b="0" dirty="0" err="1">
                 <a:effectLst/>
                 <a:latin typeface="Consolas" panose="020B0609020204030204" pitchFamily="49" charset="0"/>
               </a:rPr>
-              <a:t>GRaphCMS</a:t>
+              <a:t>Magento</a:t>
             </a:r>
             <a:r>
               <a:rPr lang="pt-BR" b="0" dirty="0">
                 <a:effectLst/>
                 <a:latin typeface="Consolas" panose="020B0609020204030204" pitchFamily="49" charset="0"/>
               </a:rPr>
-              <a:t>): Painel de ADMIN (dados fornecidos através de uma API REST ou </a:t>
+              <a:t>, e </a:t>
             </a:r>
             <a:r>
               <a:rPr lang="pt-BR" b="0" dirty="0" err="1">
                 <a:effectLst/>
                 <a:latin typeface="Consolas" panose="020B0609020204030204" pitchFamily="49" charset="0"/>
               </a:rPr>
-              <a:t>GraphQL</a:t>
+              <a:t>Drupal</a:t>
             </a:r>
             <a:r>
               <a:rPr lang="pt-BR" b="0" dirty="0">
                 <a:effectLst/>
                 <a:latin typeface="Consolas" panose="020B0609020204030204" pitchFamily="49" charset="0"/>
               </a:rPr>
-              <a:t>)</a:t>
-            </a:r>
-          </a:p>
-          <a:p>
-            <a:r>
-              <a:rPr lang="pt-BR" b="0" dirty="0" err="1">
-                <a:effectLst/>
-                <a:latin typeface="Consolas" panose="020B0609020204030204" pitchFamily="49" charset="0"/>
-              </a:rPr>
-              <a:t>React</a:t>
-            </a:r>
-            <a:r>
-              <a:rPr lang="pt-BR" b="0" dirty="0">
-                <a:effectLst/>
-                <a:latin typeface="Consolas" panose="020B0609020204030204" pitchFamily="49" charset="0"/>
-              </a:rPr>
-              <a:t> que consome essa API do CMS</a:t>
-            </a:r>
-          </a:p>
-          <a:p>
-            <a:r>
-              <a:rPr lang="pt-BR" b="0">
-                <a:effectLst/>
-                <a:latin typeface="Consolas" panose="020B0609020204030204" pitchFamily="49" charset="0"/>
-              </a:rPr>
-              <a:t>Assim </a:t>
-            </a:r>
-            <a:r>
-              <a:rPr lang="pt-BR" b="0" dirty="0">
-                <a:effectLst/>
-                <a:latin typeface="Consolas" panose="020B0609020204030204" pitchFamily="49" charset="0"/>
-              </a:rPr>
-              <a:t>a nossa aplicação vai fazer chamadas à API, buscando informações e exibindo para o </a:t>
-            </a:r>
-            <a:r>
-              <a:rPr lang="pt-BR" b="0" dirty="0" err="1">
-                <a:effectLst/>
-                <a:latin typeface="Consolas" panose="020B0609020204030204" pitchFamily="49" charset="0"/>
-              </a:rPr>
-              <a:t>usuario</a:t>
-            </a:r>
-            <a:endParaRPr lang="pt-BR" b="0" dirty="0">
-              <a:effectLst/>
-              <a:latin typeface="Consolas" panose="020B0609020204030204" pitchFamily="49" charset="0"/>
-            </a:endParaRPr>
+              <a:t> são alguns dos CMS mais populares do mercado.</a:t>
+            </a:r>
           </a:p>
           <a:p>
             <a:endParaRPr lang="pt-BR" dirty="0"/>
@@ -5448,7 +5389,7 @@
     </p:spTree>
     <p:extLst>
       <p:ext uri="{BB962C8B-B14F-4D97-AF65-F5344CB8AC3E}">
-        <p14:creationId xmlns:p14="http://schemas.microsoft.com/office/powerpoint/2010/main" val="4228340002"/>
+        <p14:creationId xmlns:p14="http://schemas.microsoft.com/office/powerpoint/2010/main" val="46020609"/>
       </p:ext>
     </p:extLst>
   </p:cSld>
@@ -5480,7 +5421,7 @@
           <p:cNvPr id="2" name="Título 1">
             <a:extLst>
               <a:ext uri="{FF2B5EF4-FFF2-40B4-BE49-F238E27FC236}">
-                <a16:creationId xmlns:a16="http://schemas.microsoft.com/office/drawing/2014/main" id="{37386DE8-3BFF-D859-39C9-60E3F9C06FA6}"/>
+                <a16:creationId xmlns:a16="http://schemas.microsoft.com/office/drawing/2014/main" id="{7E3C4FE2-5D84-867C-7AF8-EDAF6B0E2FA4}"/>
               </a:ext>
             </a:extLst>
           </p:cNvPr>
@@ -5504,69 +5445,136 @@
                 <a:effectLst/>
                 <a:latin typeface="Consolas" panose="020B0609020204030204" pitchFamily="49" charset="0"/>
               </a:rPr>
-              <a:t>Primeira Aula - </a:t>
-            </a:r>
-            <a:r>
-              <a:rPr lang="pt-BR" b="1" dirty="0" err="1">
-                <a:solidFill>
-                  <a:srgbClr val="78D1E1"/>
-                </a:solidFill>
+              <a:t>Primeira Aula - CMS</a:t>
+            </a:r>
+            <a:endParaRPr lang="pt-BR" dirty="0"/>
+          </a:p>
+        </p:txBody>
+      </p:sp>
+      <p:sp>
+        <p:nvSpPr>
+          <p:cNvPr id="3" name="Espaço Reservado para Conteúdo 2">
+            <a:extLst>
+              <a:ext uri="{FF2B5EF4-FFF2-40B4-BE49-F238E27FC236}">
+                <a16:creationId xmlns:a16="http://schemas.microsoft.com/office/drawing/2014/main" id="{02F8A83D-D14D-FC5E-688F-7041ECB18A0C}"/>
+              </a:ext>
+            </a:extLst>
+          </p:cNvPr>
+          <p:cNvSpPr>
+            <a:spLocks noGrp="1"/>
+          </p:cNvSpPr>
+          <p:nvPr>
+            <p:ph idx="1"/>
+          </p:nvPr>
+        </p:nvSpPr>
+        <p:spPr/>
+        <p:txBody>
+          <a:bodyPr/>
+          <a:lstStyle/>
+          <a:p>
+            <a:r>
+              <a:rPr lang="pt-BR" b="0" dirty="0">
+                <a:effectLst/>
+                <a:latin typeface="Consolas" panose="020B0609020204030204" pitchFamily="49" charset="0"/>
+              </a:rPr>
+              <a:t>Traz tanto o painel de ADMIN tanto quanto a parte visual do front-</a:t>
+            </a:r>
+            <a:r>
+              <a:rPr lang="pt-BR" b="0" dirty="0" err="1">
+                <a:effectLst/>
+                <a:latin typeface="Consolas" panose="020B0609020204030204" pitchFamily="49" charset="0"/>
+              </a:rPr>
+              <a:t>end</a:t>
+            </a:r>
+            <a:r>
+              <a:rPr lang="pt-BR" b="0" dirty="0">
+                <a:effectLst/>
+                <a:latin typeface="Consolas" panose="020B0609020204030204" pitchFamily="49" charset="0"/>
+              </a:rPr>
+              <a:t> (temas)</a:t>
+            </a:r>
+          </a:p>
+          <a:p>
+            <a:r>
+              <a:rPr lang="pt-BR" b="0" dirty="0" err="1">
+                <a:effectLst/>
+                <a:latin typeface="Consolas" panose="020B0609020204030204" pitchFamily="49" charset="0"/>
+              </a:rPr>
+              <a:t>Headless</a:t>
+            </a:r>
+            <a:r>
+              <a:rPr lang="pt-BR" b="0" dirty="0">
+                <a:effectLst/>
+                <a:latin typeface="Consolas" panose="020B0609020204030204" pitchFamily="49" charset="0"/>
+              </a:rPr>
+              <a:t> CMS (</a:t>
+            </a:r>
+            <a:r>
+              <a:rPr lang="pt-BR" b="0" dirty="0" err="1">
+                <a:effectLst/>
+                <a:latin typeface="Consolas" panose="020B0609020204030204" pitchFamily="49" charset="0"/>
+              </a:rPr>
+              <a:t>GRaphCMS</a:t>
+            </a:r>
+            <a:r>
+              <a:rPr lang="pt-BR" b="0" dirty="0">
+                <a:effectLst/>
+                <a:latin typeface="Consolas" panose="020B0609020204030204" pitchFamily="49" charset="0"/>
+              </a:rPr>
+              <a:t>): Painel de ADMIN (dados fornecidos através de uma API REST ou </a:t>
+            </a:r>
+            <a:r>
+              <a:rPr lang="pt-BR" b="0" dirty="0" err="1">
                 <a:effectLst/>
                 <a:latin typeface="Consolas" panose="020B0609020204030204" pitchFamily="49" charset="0"/>
               </a:rPr>
               <a:t>GraphQL</a:t>
             </a:r>
-            <a:endParaRPr lang="pt-BR" dirty="0"/>
-          </a:p>
-        </p:txBody>
-      </p:sp>
-      <p:sp>
-        <p:nvSpPr>
-          <p:cNvPr id="3" name="Espaço Reservado para Conteúdo 2">
-            <a:extLst>
-              <a:ext uri="{FF2B5EF4-FFF2-40B4-BE49-F238E27FC236}">
-                <a16:creationId xmlns:a16="http://schemas.microsoft.com/office/drawing/2014/main" id="{DEB761DB-D23E-775A-602A-6DD0E28D0C87}"/>
-              </a:ext>
-            </a:extLst>
-          </p:cNvPr>
-          <p:cNvSpPr>
-            <a:spLocks noGrp="1"/>
-          </p:cNvSpPr>
-          <p:nvPr>
-            <p:ph idx="1"/>
-          </p:nvPr>
-        </p:nvSpPr>
-        <p:spPr/>
-        <p:txBody>
-          <a:bodyPr/>
-          <a:lstStyle/>
-          <a:p>
-            <a:r>
-              <a:rPr lang="pt-BR" dirty="0" err="1"/>
-              <a:t>GraphQL</a:t>
-            </a:r>
-            <a:r>
-              <a:rPr lang="pt-BR" dirty="0"/>
-              <a:t> é uma linguagem de consulta e ambiente de execução voltada a servidores para as interfaces de programação de aplicações (APIs)</a:t>
-            </a:r>
-          </a:p>
-          <a:p>
-            <a:endParaRPr lang="pt-BR" dirty="0"/>
-          </a:p>
-          <a:p>
             <a:r>
               <a:rPr lang="pt-BR" b="0" dirty="0">
                 <a:effectLst/>
                 <a:latin typeface="Consolas" panose="020B0609020204030204" pitchFamily="49" charset="0"/>
               </a:rPr>
-              <a:t>Query / </a:t>
-            </a:r>
+              <a:t>)</a:t>
+            </a:r>
+          </a:p>
+          <a:p>
             <a:r>
               <a:rPr lang="pt-BR" b="0" dirty="0" err="1">
                 <a:effectLst/>
                 <a:latin typeface="Consolas" panose="020B0609020204030204" pitchFamily="49" charset="0"/>
               </a:rPr>
-              <a:t>mutation</a:t>
+              <a:t>React</a:t>
+            </a:r>
+            <a:r>
+              <a:rPr lang="pt-BR" b="0" dirty="0">
+                <a:effectLst/>
+                <a:latin typeface="Consolas" panose="020B0609020204030204" pitchFamily="49" charset="0"/>
+              </a:rPr>
+              <a:t> que consome essa API do CMS</a:t>
+            </a:r>
+          </a:p>
+          <a:p>
+            <a:r>
+              <a:rPr lang="pt-BR" b="0">
+                <a:effectLst/>
+                <a:latin typeface="Consolas" panose="020B0609020204030204" pitchFamily="49" charset="0"/>
+              </a:rPr>
+              <a:t>Assim </a:t>
+            </a:r>
+            <a:r>
+              <a:rPr lang="pt-BR" b="0" dirty="0">
+                <a:effectLst/>
+                <a:latin typeface="Consolas" panose="020B0609020204030204" pitchFamily="49" charset="0"/>
+              </a:rPr>
+              <a:t>a nossa aplicação vai fazer chamadas à API, buscando informações e exibindo para o </a:t>
+            </a:r>
+            <a:r>
+              <a:rPr lang="pt-BR" b="0" dirty="0" err="1">
+                <a:effectLst/>
+                <a:latin typeface="Consolas" panose="020B0609020204030204" pitchFamily="49" charset="0"/>
+              </a:rPr>
+              <a:t>usuario</a:t>
             </a:r>
             <a:endParaRPr lang="pt-BR" b="0" dirty="0">
               <a:effectLst/>
@@ -5574,38 +5582,6 @@
             </a:endParaRPr>
           </a:p>
           <a:p>
-            <a:r>
-              <a:rPr lang="pt-BR" b="0" dirty="0" err="1">
-                <a:effectLst/>
-                <a:latin typeface="Consolas" panose="020B0609020204030204" pitchFamily="49" charset="0"/>
-              </a:rPr>
-              <a:t>querry</a:t>
-            </a:r>
-            <a:r>
-              <a:rPr lang="pt-BR" b="0" dirty="0">
-                <a:effectLst/>
-                <a:latin typeface="Consolas" panose="020B0609020204030204" pitchFamily="49" charset="0"/>
-              </a:rPr>
-              <a:t> = buscar dados</a:t>
-            </a:r>
-          </a:p>
-          <a:p>
-            <a:r>
-              <a:rPr lang="pt-BR" b="0" dirty="0" err="1">
-                <a:effectLst/>
-                <a:latin typeface="Consolas" panose="020B0609020204030204" pitchFamily="49" charset="0"/>
-              </a:rPr>
-              <a:t>mutation</a:t>
-            </a:r>
-            <a:r>
-              <a:rPr lang="pt-BR" b="0" dirty="0">
-                <a:effectLst/>
-                <a:latin typeface="Consolas" panose="020B0609020204030204" pitchFamily="49" charset="0"/>
-              </a:rPr>
-              <a:t> = criar, alterar, deletar dados</a:t>
-            </a:r>
-          </a:p>
-          <a:p>
             <a:endParaRPr lang="pt-BR" dirty="0"/>
           </a:p>
         </p:txBody>
@@ -5613,7 +5589,7 @@
     </p:spTree>
     <p:extLst>
       <p:ext uri="{BB962C8B-B14F-4D97-AF65-F5344CB8AC3E}">
-        <p14:creationId xmlns:p14="http://schemas.microsoft.com/office/powerpoint/2010/main" val="1518461243"/>
+        <p14:creationId xmlns:p14="http://schemas.microsoft.com/office/powerpoint/2010/main" val="4228340002"/>
       </p:ext>
     </p:extLst>
   </p:cSld>
@@ -5645,7 +5621,7 @@
           <p:cNvPr id="2" name="Título 1">
             <a:extLst>
               <a:ext uri="{FF2B5EF4-FFF2-40B4-BE49-F238E27FC236}">
-                <a16:creationId xmlns:a16="http://schemas.microsoft.com/office/drawing/2014/main" id="{A01883DC-68DB-E81F-CCAD-790663C0F82B}"/>
+                <a16:creationId xmlns:a16="http://schemas.microsoft.com/office/drawing/2014/main" id="{37386DE8-3BFF-D859-39C9-60E3F9C06FA6}"/>
               </a:ext>
             </a:extLst>
           </p:cNvPr>
@@ -5690,7 +5666,7 @@
           <p:cNvPr id="3" name="Espaço Reservado para Conteúdo 2">
             <a:extLst>
               <a:ext uri="{FF2B5EF4-FFF2-40B4-BE49-F238E27FC236}">
-                <a16:creationId xmlns:a16="http://schemas.microsoft.com/office/drawing/2014/main" id="{B699F8FA-491B-8B33-2EFC-3E19B31CEB21}"/>
+                <a16:creationId xmlns:a16="http://schemas.microsoft.com/office/drawing/2014/main" id="{DEB761DB-D23E-775A-602A-6DD0E28D0C87}"/>
               </a:ext>
             </a:extLst>
           </p:cNvPr>
@@ -5701,147 +5677,73 @@
             <p:ph idx="1"/>
           </p:nvPr>
         </p:nvSpPr>
-        <p:spPr>
-          <a:xfrm>
-            <a:off x="838200" y="1825625"/>
-            <a:ext cx="10515600" cy="4283627"/>
-          </a:xfrm>
-        </p:spPr>
-        <p:txBody>
-          <a:bodyPr/>
-          <a:lstStyle/>
-          <a:p>
+        <p:spPr/>
+        <p:txBody>
+          <a:bodyPr/>
+          <a:lstStyle/>
+          <a:p>
+            <a:r>
+              <a:rPr lang="pt-BR" dirty="0" err="1"/>
+              <a:t>GraphQL</a:t>
+            </a:r>
+            <a:r>
+              <a:rPr lang="pt-BR" dirty="0"/>
+              <a:t> é uma linguagem de consulta e ambiente de execução voltada a servidores para as interfaces de programação de aplicações (APIs)</a:t>
+            </a:r>
+          </a:p>
+          <a:p>
+            <a:endParaRPr lang="pt-BR" dirty="0"/>
+          </a:p>
+          <a:p>
+            <a:r>
+              <a:rPr lang="pt-BR" b="0" dirty="0">
+                <a:effectLst/>
+                <a:latin typeface="Consolas" panose="020B0609020204030204" pitchFamily="49" charset="0"/>
+              </a:rPr>
+              <a:t>Query / </a:t>
+            </a:r>
             <a:r>
               <a:rPr lang="pt-BR" b="0" dirty="0" err="1">
                 <a:effectLst/>
                 <a:latin typeface="Consolas" panose="020B0609020204030204" pitchFamily="49" charset="0"/>
               </a:rPr>
-              <a:t>Overfating</a:t>
+              <a:t>mutation</a:t>
+            </a:r>
+            <a:endParaRPr lang="pt-BR" b="0" dirty="0">
+              <a:effectLst/>
+              <a:latin typeface="Consolas" panose="020B0609020204030204" pitchFamily="49" charset="0"/>
+            </a:endParaRPr>
+          </a:p>
+          <a:p>
+            <a:r>
+              <a:rPr lang="pt-BR" b="0" dirty="0" err="1">
+                <a:effectLst/>
+                <a:latin typeface="Consolas" panose="020B0609020204030204" pitchFamily="49" charset="0"/>
+              </a:rPr>
+              <a:t>querry</a:t>
             </a:r>
             <a:r>
               <a:rPr lang="pt-BR" b="0" dirty="0">
                 <a:effectLst/>
                 <a:latin typeface="Consolas" panose="020B0609020204030204" pitchFamily="49" charset="0"/>
               </a:rPr>
-              <a:t> = </a:t>
-            </a:r>
+              <a:t> = buscar dados</a:t>
+            </a:r>
+          </a:p>
+          <a:p>
             <a:r>
               <a:rPr lang="pt-BR" b="0" dirty="0" err="1">
                 <a:effectLst/>
                 <a:latin typeface="Consolas" panose="020B0609020204030204" pitchFamily="49" charset="0"/>
               </a:rPr>
-              <a:t>back-end</a:t>
+              <a:t>mutation</a:t>
             </a:r>
             <a:r>
               <a:rPr lang="pt-BR" b="0" dirty="0">
                 <a:effectLst/>
                 <a:latin typeface="Consolas" panose="020B0609020204030204" pitchFamily="49" charset="0"/>
               </a:rPr>
-              <a:t> retorna mais coisas que o front precisa</a:t>
-            </a:r>
-          </a:p>
-          <a:p>
-            <a:r>
-              <a:rPr lang="pt-BR" b="0" dirty="0" err="1">
-                <a:effectLst/>
-                <a:latin typeface="Consolas" panose="020B0609020204030204" pitchFamily="49" charset="0"/>
-              </a:rPr>
-              <a:t>Underfating</a:t>
-            </a:r>
-            <a:r>
-              <a:rPr lang="pt-BR" b="0" dirty="0">
-                <a:effectLst/>
-                <a:latin typeface="Consolas" panose="020B0609020204030204" pitchFamily="49" charset="0"/>
-              </a:rPr>
-              <a:t> = o </a:t>
-            </a:r>
-            <a:r>
-              <a:rPr lang="pt-BR" b="0" dirty="0" err="1">
-                <a:effectLst/>
-                <a:latin typeface="Consolas" panose="020B0609020204030204" pitchFamily="49" charset="0"/>
-              </a:rPr>
-              <a:t>back</a:t>
-            </a:r>
-            <a:r>
-              <a:rPr lang="pt-BR" b="0" dirty="0">
-                <a:effectLst/>
-                <a:latin typeface="Consolas" panose="020B0609020204030204" pitchFamily="49" charset="0"/>
-              </a:rPr>
-              <a:t> não retorna todas as </a:t>
-            </a:r>
-            <a:r>
-              <a:rPr lang="pt-BR" b="0" dirty="0" err="1">
-                <a:effectLst/>
-                <a:latin typeface="Consolas" panose="020B0609020204030204" pitchFamily="49" charset="0"/>
-              </a:rPr>
-              <a:t>infromações</a:t>
-            </a:r>
-            <a:r>
-              <a:rPr lang="pt-BR" b="0" dirty="0">
-                <a:effectLst/>
-                <a:latin typeface="Consolas" panose="020B0609020204030204" pitchFamily="49" charset="0"/>
-              </a:rPr>
-              <a:t> que precisamos no front</a:t>
-            </a:r>
-          </a:p>
-          <a:p>
-            <a:pPr marL="0" indent="0">
-              <a:buNone/>
-            </a:pPr>
-            <a:br>
-              <a:rPr lang="pt-BR" b="0" dirty="0">
-                <a:effectLst/>
-                <a:latin typeface="Consolas" panose="020B0609020204030204" pitchFamily="49" charset="0"/>
-              </a:rPr>
-            </a:br>
-            <a:r>
-              <a:rPr lang="pt-BR" b="0" dirty="0">
-                <a:effectLst/>
-                <a:latin typeface="Consolas" panose="020B0609020204030204" pitchFamily="49" charset="0"/>
-              </a:rPr>
-              <a:t>    </a:t>
-            </a:r>
-            <a:r>
-              <a:rPr lang="pt-BR" b="0" dirty="0" err="1">
-                <a:effectLst/>
-                <a:latin typeface="Consolas" panose="020B0609020204030204" pitchFamily="49" charset="0"/>
-              </a:rPr>
-              <a:t>GraphQL</a:t>
-            </a:r>
-            <a:r>
-              <a:rPr lang="pt-BR" b="0" dirty="0">
-                <a:effectLst/>
-                <a:latin typeface="Consolas" panose="020B0609020204030204" pitchFamily="49" charset="0"/>
-              </a:rPr>
-              <a:t> é o front que passa para o </a:t>
-            </a:r>
-            <a:r>
-              <a:rPr lang="pt-BR" b="0" dirty="0" err="1">
-                <a:effectLst/>
-                <a:latin typeface="Consolas" panose="020B0609020204030204" pitchFamily="49" charset="0"/>
-              </a:rPr>
-              <a:t>back</a:t>
-            </a:r>
-            <a:r>
-              <a:rPr lang="pt-BR" b="0" dirty="0">
-                <a:effectLst/>
-                <a:latin typeface="Consolas" panose="020B0609020204030204" pitchFamily="49" charset="0"/>
-              </a:rPr>
-              <a:t> quais informações ele precisa, o </a:t>
-            </a:r>
-            <a:r>
-              <a:rPr lang="pt-BR" b="0" dirty="0" err="1">
-                <a:effectLst/>
-                <a:latin typeface="Consolas" panose="020B0609020204030204" pitchFamily="49" charset="0"/>
-              </a:rPr>
-              <a:t>back</a:t>
-            </a:r>
-            <a:r>
-              <a:rPr lang="pt-BR" b="0" dirty="0">
-                <a:effectLst/>
-                <a:latin typeface="Consolas" panose="020B0609020204030204" pitchFamily="49" charset="0"/>
-              </a:rPr>
-              <a:t> se adapta conforme os dados que o front precisa</a:t>
+              <a:t> = criar, alterar, deletar dados</a:t>
             </a:r>
           </a:p>
           <a:p>
@@ -5852,7 +5754,7 @@
     </p:spTree>
     <p:extLst>
       <p:ext uri="{BB962C8B-B14F-4D97-AF65-F5344CB8AC3E}">
-        <p14:creationId xmlns:p14="http://schemas.microsoft.com/office/powerpoint/2010/main" val="2609959196"/>
+        <p14:creationId xmlns:p14="http://schemas.microsoft.com/office/powerpoint/2010/main" val="1518461243"/>
       </p:ext>
     </p:extLst>
   </p:cSld>
@@ -5884,6 +5786,245 @@
           <p:cNvPr id="2" name="Título 1">
             <a:extLst>
               <a:ext uri="{FF2B5EF4-FFF2-40B4-BE49-F238E27FC236}">
+                <a16:creationId xmlns:a16="http://schemas.microsoft.com/office/drawing/2014/main" id="{A01883DC-68DB-E81F-CCAD-790663C0F82B}"/>
+              </a:ext>
+            </a:extLst>
+          </p:cNvPr>
+          <p:cNvSpPr>
+            <a:spLocks noGrp="1"/>
+          </p:cNvSpPr>
+          <p:nvPr>
+            <p:ph type="title"/>
+          </p:nvPr>
+        </p:nvSpPr>
+        <p:spPr/>
+        <p:txBody>
+          <a:bodyPr/>
+          <a:lstStyle/>
+          <a:p>
+            <a:r>
+              <a:rPr lang="pt-BR" b="1" dirty="0">
+                <a:solidFill>
+                  <a:srgbClr val="78D1E1"/>
+                </a:solidFill>
+                <a:effectLst/>
+                <a:latin typeface="Consolas" panose="020B0609020204030204" pitchFamily="49" charset="0"/>
+              </a:rPr>
+              <a:t>Primeira Aula - </a:t>
+            </a:r>
+            <a:r>
+              <a:rPr lang="pt-BR" b="1" dirty="0" err="1">
+                <a:solidFill>
+                  <a:srgbClr val="78D1E1"/>
+                </a:solidFill>
+                <a:effectLst/>
+                <a:latin typeface="Consolas" panose="020B0609020204030204" pitchFamily="49" charset="0"/>
+              </a:rPr>
+              <a:t>GraphQL</a:t>
+            </a:r>
+            <a:endParaRPr lang="pt-BR" dirty="0"/>
+          </a:p>
+        </p:txBody>
+      </p:sp>
+      <p:sp>
+        <p:nvSpPr>
+          <p:cNvPr id="3" name="Espaço Reservado para Conteúdo 2">
+            <a:extLst>
+              <a:ext uri="{FF2B5EF4-FFF2-40B4-BE49-F238E27FC236}">
+                <a16:creationId xmlns:a16="http://schemas.microsoft.com/office/drawing/2014/main" id="{B699F8FA-491B-8B33-2EFC-3E19B31CEB21}"/>
+              </a:ext>
+            </a:extLst>
+          </p:cNvPr>
+          <p:cNvSpPr>
+            <a:spLocks noGrp="1"/>
+          </p:cNvSpPr>
+          <p:nvPr>
+            <p:ph idx="1"/>
+          </p:nvPr>
+        </p:nvSpPr>
+        <p:spPr>
+          <a:xfrm>
+            <a:off x="838200" y="1825625"/>
+            <a:ext cx="10515600" cy="4283627"/>
+          </a:xfrm>
+        </p:spPr>
+        <p:txBody>
+          <a:bodyPr/>
+          <a:lstStyle/>
+          <a:p>
+            <a:r>
+              <a:rPr lang="pt-BR" b="0" dirty="0" err="1">
+                <a:effectLst/>
+                <a:latin typeface="Consolas" panose="020B0609020204030204" pitchFamily="49" charset="0"/>
+              </a:rPr>
+              <a:t>Overfating</a:t>
+            </a:r>
+            <a:r>
+              <a:rPr lang="pt-BR" b="0" dirty="0">
+                <a:effectLst/>
+                <a:latin typeface="Consolas" panose="020B0609020204030204" pitchFamily="49" charset="0"/>
+              </a:rPr>
+              <a:t> = </a:t>
+            </a:r>
+            <a:r>
+              <a:rPr lang="pt-BR" b="0" dirty="0" err="1">
+                <a:effectLst/>
+                <a:latin typeface="Consolas" panose="020B0609020204030204" pitchFamily="49" charset="0"/>
+              </a:rPr>
+              <a:t>back-end</a:t>
+            </a:r>
+            <a:r>
+              <a:rPr lang="pt-BR" b="0" dirty="0">
+                <a:effectLst/>
+                <a:latin typeface="Consolas" panose="020B0609020204030204" pitchFamily="49" charset="0"/>
+              </a:rPr>
+              <a:t> retorna mais coisas que o front precisa</a:t>
+            </a:r>
+          </a:p>
+          <a:p>
+            <a:r>
+              <a:rPr lang="pt-BR" b="0" dirty="0" err="1">
+                <a:effectLst/>
+                <a:latin typeface="Consolas" panose="020B0609020204030204" pitchFamily="49" charset="0"/>
+              </a:rPr>
+              <a:t>Underfating</a:t>
+            </a:r>
+            <a:r>
+              <a:rPr lang="pt-BR" b="0" dirty="0">
+                <a:effectLst/>
+                <a:latin typeface="Consolas" panose="020B0609020204030204" pitchFamily="49" charset="0"/>
+              </a:rPr>
+              <a:t> = o </a:t>
+            </a:r>
+            <a:r>
+              <a:rPr lang="pt-BR" b="0" dirty="0" err="1">
+                <a:effectLst/>
+                <a:latin typeface="Consolas" panose="020B0609020204030204" pitchFamily="49" charset="0"/>
+              </a:rPr>
+              <a:t>back</a:t>
+            </a:r>
+            <a:r>
+              <a:rPr lang="pt-BR" b="0" dirty="0">
+                <a:effectLst/>
+                <a:latin typeface="Consolas" panose="020B0609020204030204" pitchFamily="49" charset="0"/>
+              </a:rPr>
+              <a:t> não retorna todas as </a:t>
+            </a:r>
+            <a:r>
+              <a:rPr lang="pt-BR" b="0" dirty="0" err="1">
+                <a:effectLst/>
+                <a:latin typeface="Consolas" panose="020B0609020204030204" pitchFamily="49" charset="0"/>
+              </a:rPr>
+              <a:t>infromações</a:t>
+            </a:r>
+            <a:r>
+              <a:rPr lang="pt-BR" b="0" dirty="0">
+                <a:effectLst/>
+                <a:latin typeface="Consolas" panose="020B0609020204030204" pitchFamily="49" charset="0"/>
+              </a:rPr>
+              <a:t> que precisamos no front</a:t>
+            </a:r>
+          </a:p>
+          <a:p>
+            <a:pPr marL="0" indent="0">
+              <a:buNone/>
+            </a:pPr>
+            <a:br>
+              <a:rPr lang="pt-BR" b="0" dirty="0">
+                <a:effectLst/>
+                <a:latin typeface="Consolas" panose="020B0609020204030204" pitchFamily="49" charset="0"/>
+              </a:rPr>
+            </a:br>
+            <a:r>
+              <a:rPr lang="pt-BR" b="0" dirty="0">
+                <a:effectLst/>
+                <a:latin typeface="Consolas" panose="020B0609020204030204" pitchFamily="49" charset="0"/>
+              </a:rPr>
+              <a:t>    </a:t>
+            </a:r>
+            <a:r>
+              <a:rPr lang="pt-BR" b="0" dirty="0" err="1">
+                <a:effectLst/>
+                <a:latin typeface="Consolas" panose="020B0609020204030204" pitchFamily="49" charset="0"/>
+              </a:rPr>
+              <a:t>GraphQL</a:t>
+            </a:r>
+            <a:r>
+              <a:rPr lang="pt-BR" b="0" dirty="0">
+                <a:effectLst/>
+                <a:latin typeface="Consolas" panose="020B0609020204030204" pitchFamily="49" charset="0"/>
+              </a:rPr>
+              <a:t> é o front que passa para o </a:t>
+            </a:r>
+            <a:r>
+              <a:rPr lang="pt-BR" b="0" dirty="0" err="1">
+                <a:effectLst/>
+                <a:latin typeface="Consolas" panose="020B0609020204030204" pitchFamily="49" charset="0"/>
+              </a:rPr>
+              <a:t>back</a:t>
+            </a:r>
+            <a:r>
+              <a:rPr lang="pt-BR" b="0" dirty="0">
+                <a:effectLst/>
+                <a:latin typeface="Consolas" panose="020B0609020204030204" pitchFamily="49" charset="0"/>
+              </a:rPr>
+              <a:t> quais informações ele precisa, o </a:t>
+            </a:r>
+            <a:r>
+              <a:rPr lang="pt-BR" b="0" dirty="0" err="1">
+                <a:effectLst/>
+                <a:latin typeface="Consolas" panose="020B0609020204030204" pitchFamily="49" charset="0"/>
+              </a:rPr>
+              <a:t>back</a:t>
+            </a:r>
+            <a:r>
+              <a:rPr lang="pt-BR" b="0" dirty="0">
+                <a:effectLst/>
+                <a:latin typeface="Consolas" panose="020B0609020204030204" pitchFamily="49" charset="0"/>
+              </a:rPr>
+              <a:t> se adapta conforme os dados que o front precisa</a:t>
+            </a:r>
+          </a:p>
+          <a:p>
+            <a:endParaRPr lang="pt-BR" dirty="0"/>
+          </a:p>
+        </p:txBody>
+      </p:sp>
+    </p:spTree>
+    <p:extLst>
+      <p:ext uri="{BB962C8B-B14F-4D97-AF65-F5344CB8AC3E}">
+        <p14:creationId xmlns:p14="http://schemas.microsoft.com/office/powerpoint/2010/main" val="2609959196"/>
+      </p:ext>
+    </p:extLst>
+  </p:cSld>
+  <p:clrMapOvr>
+    <a:masterClrMapping/>
+  </p:clrMapOvr>
+</p:sld>
+</file>
+
+<file path=ppt/slides/slide27.xml><?xml version="1.0" encoding="utf-8"?>
+<p:sld xmlns:a="http://schemas.openxmlformats.org/drawingml/2006/main" xmlns:r="http://schemas.openxmlformats.org/officeDocument/2006/relationships" xmlns:p="http://schemas.openxmlformats.org/presentationml/2006/main">
+  <p:cSld>
+    <p:spTree>
+      <p:nvGrpSpPr>
+        <p:cNvPr id="1" name=""/>
+        <p:cNvGrpSpPr/>
+        <p:nvPr/>
+      </p:nvGrpSpPr>
+      <p:grpSpPr>
+        <a:xfrm>
+          <a:off x="0" y="0"/>
+          <a:ext cx="0" cy="0"/>
+          <a:chOff x="0" y="0"/>
+          <a:chExt cx="0" cy="0"/>
+        </a:xfrm>
+      </p:grpSpPr>
+      <p:sp>
+        <p:nvSpPr>
+          <p:cNvPr id="2" name="Título 1">
+            <a:extLst>
+              <a:ext uri="{FF2B5EF4-FFF2-40B4-BE49-F238E27FC236}">
                 <a16:creationId xmlns:a16="http://schemas.microsoft.com/office/drawing/2014/main" id="{A24E6F56-526B-18FD-868F-6A39EC323C04}"/>
               </a:ext>
             </a:extLst>
@@ -5971,7 +6112,7 @@
 </p:sld>
 </file>
 
-<file path=ppt/slides/slide27.xml><?xml version="1.0" encoding="utf-8"?>
+<file path=ppt/slides/slide28.xml><?xml version="1.0" encoding="utf-8"?>
 <p:sld xmlns:a="http://schemas.openxmlformats.org/drawingml/2006/main" xmlns:r="http://schemas.openxmlformats.org/officeDocument/2006/relationships" xmlns:p="http://schemas.openxmlformats.org/presentationml/2006/main">
   <p:cSld>
     <p:bg>
@@ -6195,7 +6336,7 @@
 </p:sld>
 </file>
 
-<file path=ppt/slides/slide28.xml><?xml version="1.0" encoding="utf-8"?>
+<file path=ppt/slides/slide29.xml><?xml version="1.0" encoding="utf-8"?>
 <p:sld xmlns:a="http://schemas.openxmlformats.org/drawingml/2006/main" xmlns:r="http://schemas.openxmlformats.org/officeDocument/2006/relationships" xmlns:p="http://schemas.openxmlformats.org/presentationml/2006/main">
   <p:cSld>
     <p:bg>
@@ -6419,108 +6560,6 @@
 </p:sld>
 </file>
 
-<file path=ppt/slides/slide29.xml><?xml version="1.0" encoding="utf-8"?>
-<p:sld xmlns:a="http://schemas.openxmlformats.org/drawingml/2006/main" xmlns:r="http://schemas.openxmlformats.org/officeDocument/2006/relationships" xmlns:p="http://schemas.openxmlformats.org/presentationml/2006/main">
-  <p:cSld>
-    <p:spTree>
-      <p:nvGrpSpPr>
-        <p:cNvPr id="1" name=""/>
-        <p:cNvGrpSpPr/>
-        <p:nvPr/>
-      </p:nvGrpSpPr>
-      <p:grpSpPr>
-        <a:xfrm>
-          <a:off x="0" y="0"/>
-          <a:ext cx="0" cy="0"/>
-          <a:chOff x="0" y="0"/>
-          <a:chExt cx="0" cy="0"/>
-        </a:xfrm>
-      </p:grpSpPr>
-      <p:sp>
-        <p:nvSpPr>
-          <p:cNvPr id="2" name="Título 1">
-            <a:extLst>
-              <a:ext uri="{FF2B5EF4-FFF2-40B4-BE49-F238E27FC236}">
-                <a16:creationId xmlns:a16="http://schemas.microsoft.com/office/drawing/2014/main" id="{45203928-0AC7-E02F-279E-EE989492400C}"/>
-              </a:ext>
-            </a:extLst>
-          </p:cNvPr>
-          <p:cNvSpPr>
-            <a:spLocks noGrp="1"/>
-          </p:cNvSpPr>
-          <p:nvPr>
-            <p:ph type="title"/>
-          </p:nvPr>
-        </p:nvSpPr>
-        <p:spPr/>
-        <p:txBody>
-          <a:bodyPr/>
-          <a:lstStyle/>
-          <a:p>
-            <a:endParaRPr lang="pt-BR" dirty="0"/>
-          </a:p>
-        </p:txBody>
-      </p:sp>
-      <p:sp>
-        <p:nvSpPr>
-          <p:cNvPr id="3" name="Espaço Reservado para Conteúdo 2">
-            <a:extLst>
-              <a:ext uri="{FF2B5EF4-FFF2-40B4-BE49-F238E27FC236}">
-                <a16:creationId xmlns:a16="http://schemas.microsoft.com/office/drawing/2014/main" id="{5C26AB0A-1856-7DFF-4C7B-F64F600CC14E}"/>
-              </a:ext>
-            </a:extLst>
-          </p:cNvPr>
-          <p:cNvSpPr>
-            <a:spLocks noGrp="1"/>
-          </p:cNvSpPr>
-          <p:nvPr>
-            <p:ph idx="1"/>
-          </p:nvPr>
-        </p:nvSpPr>
-        <p:spPr/>
-        <p:txBody>
-          <a:bodyPr/>
-          <a:lstStyle/>
-          <a:p>
-            <a:r>
-              <a:rPr lang="pt-BR" dirty="0" err="1"/>
-              <a:t>Componentização</a:t>
-            </a:r>
-            <a:r>
-              <a:rPr lang="pt-BR" dirty="0"/>
-              <a:t>, dois momentos quando criamos um componente:</a:t>
-            </a:r>
-          </a:p>
-          <a:p>
-            <a:endParaRPr lang="pt-BR" dirty="0"/>
-          </a:p>
-          <a:p>
-            <a:r>
-              <a:rPr lang="pt-BR" dirty="0"/>
-              <a:t>Quando aquilo se repete várias vezes</a:t>
-            </a:r>
-          </a:p>
-          <a:p>
-            <a:r>
-              <a:rPr lang="pt-BR" dirty="0"/>
-              <a:t>Quando consigo desacoplar algo que não influencia no restante do projeto</a:t>
-            </a:r>
-          </a:p>
-        </p:txBody>
-      </p:sp>
-    </p:spTree>
-    <p:extLst>
-      <p:ext uri="{BB962C8B-B14F-4D97-AF65-F5344CB8AC3E}">
-        <p14:creationId xmlns:p14="http://schemas.microsoft.com/office/powerpoint/2010/main" val="2212206752"/>
-      </p:ext>
-    </p:extLst>
-  </p:cSld>
-  <p:clrMapOvr>
-    <a:masterClrMapping/>
-  </p:clrMapOvr>
-</p:sld>
-</file>
-
 <file path=ppt/slides/slide3.xml><?xml version="1.0" encoding="utf-8"?>
 <p:sld xmlns:a="http://schemas.openxmlformats.org/drawingml/2006/main" xmlns:r="http://schemas.openxmlformats.org/officeDocument/2006/relationships" xmlns:p="http://schemas.openxmlformats.org/presentationml/2006/main">
   <p:cSld>
@@ -6818,6 +6857,108 @@
           <p:cNvPr id="2" name="Título 1">
             <a:extLst>
               <a:ext uri="{FF2B5EF4-FFF2-40B4-BE49-F238E27FC236}">
+                <a16:creationId xmlns:a16="http://schemas.microsoft.com/office/drawing/2014/main" id="{45203928-0AC7-E02F-279E-EE989492400C}"/>
+              </a:ext>
+            </a:extLst>
+          </p:cNvPr>
+          <p:cNvSpPr>
+            <a:spLocks noGrp="1"/>
+          </p:cNvSpPr>
+          <p:nvPr>
+            <p:ph type="title"/>
+          </p:nvPr>
+        </p:nvSpPr>
+        <p:spPr/>
+        <p:txBody>
+          <a:bodyPr/>
+          <a:lstStyle/>
+          <a:p>
+            <a:endParaRPr lang="pt-BR" dirty="0"/>
+          </a:p>
+        </p:txBody>
+      </p:sp>
+      <p:sp>
+        <p:nvSpPr>
+          <p:cNvPr id="3" name="Espaço Reservado para Conteúdo 2">
+            <a:extLst>
+              <a:ext uri="{FF2B5EF4-FFF2-40B4-BE49-F238E27FC236}">
+                <a16:creationId xmlns:a16="http://schemas.microsoft.com/office/drawing/2014/main" id="{5C26AB0A-1856-7DFF-4C7B-F64F600CC14E}"/>
+              </a:ext>
+            </a:extLst>
+          </p:cNvPr>
+          <p:cNvSpPr>
+            <a:spLocks noGrp="1"/>
+          </p:cNvSpPr>
+          <p:nvPr>
+            <p:ph idx="1"/>
+          </p:nvPr>
+        </p:nvSpPr>
+        <p:spPr/>
+        <p:txBody>
+          <a:bodyPr/>
+          <a:lstStyle/>
+          <a:p>
+            <a:r>
+              <a:rPr lang="pt-BR" dirty="0" err="1"/>
+              <a:t>Componentização</a:t>
+            </a:r>
+            <a:r>
+              <a:rPr lang="pt-BR" dirty="0"/>
+              <a:t>, dois momentos quando criamos um componente:</a:t>
+            </a:r>
+          </a:p>
+          <a:p>
+            <a:endParaRPr lang="pt-BR" dirty="0"/>
+          </a:p>
+          <a:p>
+            <a:r>
+              <a:rPr lang="pt-BR" dirty="0"/>
+              <a:t>Quando aquilo se repete várias vezes</a:t>
+            </a:r>
+          </a:p>
+          <a:p>
+            <a:r>
+              <a:rPr lang="pt-BR" dirty="0"/>
+              <a:t>Quando consigo desacoplar algo que não influencia no restante do projeto</a:t>
+            </a:r>
+          </a:p>
+        </p:txBody>
+      </p:sp>
+    </p:spTree>
+    <p:extLst>
+      <p:ext uri="{BB962C8B-B14F-4D97-AF65-F5344CB8AC3E}">
+        <p14:creationId xmlns:p14="http://schemas.microsoft.com/office/powerpoint/2010/main" val="2212206752"/>
+      </p:ext>
+    </p:extLst>
+  </p:cSld>
+  <p:clrMapOvr>
+    <a:masterClrMapping/>
+  </p:clrMapOvr>
+</p:sld>
+</file>
+
+<file path=ppt/slides/slide31.xml><?xml version="1.0" encoding="utf-8"?>
+<p:sld xmlns:a="http://schemas.openxmlformats.org/drawingml/2006/main" xmlns:r="http://schemas.openxmlformats.org/officeDocument/2006/relationships" xmlns:p="http://schemas.openxmlformats.org/presentationml/2006/main">
+  <p:cSld>
+    <p:spTree>
+      <p:nvGrpSpPr>
+        <p:cNvPr id="1" name=""/>
+        <p:cNvGrpSpPr/>
+        <p:nvPr/>
+      </p:nvGrpSpPr>
+      <p:grpSpPr>
+        <a:xfrm>
+          <a:off x="0" y="0"/>
+          <a:ext cx="0" cy="0"/>
+          <a:chOff x="0" y="0"/>
+          <a:chExt cx="0" cy="0"/>
+        </a:xfrm>
+      </p:grpSpPr>
+      <p:sp>
+        <p:nvSpPr>
+          <p:cNvPr id="2" name="Título 1">
+            <a:extLst>
+              <a:ext uri="{FF2B5EF4-FFF2-40B4-BE49-F238E27FC236}">
                 <a16:creationId xmlns:a16="http://schemas.microsoft.com/office/drawing/2014/main" id="{5E9FB50D-FE1C-A31A-4BE6-88E5C2CD9F5B}"/>
               </a:ext>
             </a:extLst>
@@ -6857,7 +6998,12 @@
             <p:ph idx="1"/>
           </p:nvPr>
         </p:nvSpPr>
-        <p:spPr/>
+        <p:spPr>
+          <a:xfrm>
+            <a:off x="732182" y="1799120"/>
+            <a:ext cx="10515600" cy="4351338"/>
+          </a:xfrm>
+        </p:spPr>
         <p:txBody>
           <a:bodyPr/>
           <a:lstStyle/>
@@ -6888,7 +7034,7 @@
 </p:sld>
 </file>
 
-<file path=ppt/slides/slide31.xml><?xml version="1.0" encoding="utf-8"?>
+<file path=ppt/slides/slide32.xml><?xml version="1.0" encoding="utf-8"?>
 <p:sld xmlns:a="http://schemas.openxmlformats.org/drawingml/2006/main" xmlns:r="http://schemas.openxmlformats.org/officeDocument/2006/relationships" xmlns:p="http://schemas.openxmlformats.org/presentationml/2006/main">
   <p:cSld>
     <p:spTree>
@@ -6998,7 +7144,7 @@
 </p:sld>
 </file>
 
-<file path=ppt/slides/slide32.xml><?xml version="1.0" encoding="utf-8"?>
+<file path=ppt/slides/slide33.xml><?xml version="1.0" encoding="utf-8"?>
 <p:sld xmlns:a="http://schemas.openxmlformats.org/drawingml/2006/main" xmlns:r="http://schemas.openxmlformats.org/officeDocument/2006/relationships" xmlns:p="http://schemas.openxmlformats.org/presentationml/2006/main">
   <p:cSld>
     <p:spTree>
@@ -7084,10 +7230,496 @@
           </a:p>
         </p:txBody>
       </p:sp>
+      <p:pic>
+        <p:nvPicPr>
+          <p:cNvPr id="5" name="Imagem 4">
+            <a:extLst>
+              <a:ext uri="{FF2B5EF4-FFF2-40B4-BE49-F238E27FC236}">
+                <a16:creationId xmlns:a16="http://schemas.microsoft.com/office/drawing/2014/main" id="{E87B9066-5B35-1BA8-082E-64633B05CF22}"/>
+              </a:ext>
+            </a:extLst>
+          </p:cNvPr>
+          <p:cNvPicPr>
+            <a:picLocks noChangeAspect="1"/>
+          </p:cNvPicPr>
+          <p:nvPr/>
+        </p:nvPicPr>
+        <p:blipFill>
+          <a:blip r:embed="rId2"/>
+          <a:stretch>
+            <a:fillRect/>
+          </a:stretch>
+        </p:blipFill>
+        <p:spPr>
+          <a:xfrm>
+            <a:off x="1366077" y="2564554"/>
+            <a:ext cx="9459846" cy="277119"/>
+          </a:xfrm>
+          <a:prstGeom prst="rect">
+            <a:avLst/>
+          </a:prstGeom>
+        </p:spPr>
+      </p:pic>
+      <p:pic>
+        <p:nvPicPr>
+          <p:cNvPr id="7" name="Imagem 6">
+            <a:extLst>
+              <a:ext uri="{FF2B5EF4-FFF2-40B4-BE49-F238E27FC236}">
+                <a16:creationId xmlns:a16="http://schemas.microsoft.com/office/drawing/2014/main" id="{94C757EB-224E-8811-4A1B-77608CDF8870}"/>
+              </a:ext>
+            </a:extLst>
+          </p:cNvPr>
+          <p:cNvPicPr>
+            <a:picLocks noChangeAspect="1"/>
+          </p:cNvPicPr>
+          <p:nvPr/>
+        </p:nvPicPr>
+        <p:blipFill>
+          <a:blip r:embed="rId3"/>
+          <a:stretch>
+            <a:fillRect/>
+          </a:stretch>
+        </p:blipFill>
+        <p:spPr>
+          <a:xfrm>
+            <a:off x="1909868" y="3607016"/>
+            <a:ext cx="8372263" cy="615852"/>
+          </a:xfrm>
+          <a:prstGeom prst="rect">
+            <a:avLst/>
+          </a:prstGeom>
+        </p:spPr>
+      </p:pic>
     </p:spTree>
     <p:extLst>
       <p:ext uri="{BB962C8B-B14F-4D97-AF65-F5344CB8AC3E}">
         <p14:creationId xmlns:p14="http://schemas.microsoft.com/office/powerpoint/2010/main" val="3981357772"/>
+      </p:ext>
+    </p:extLst>
+  </p:cSld>
+  <p:clrMapOvr>
+    <a:masterClrMapping/>
+  </p:clrMapOvr>
+</p:sld>
+</file>
+
+<file path=ppt/slides/slide34.xml><?xml version="1.0" encoding="utf-8"?>
+<p:sld xmlns:a="http://schemas.openxmlformats.org/drawingml/2006/main" xmlns:r="http://schemas.openxmlformats.org/officeDocument/2006/relationships" xmlns:p="http://schemas.openxmlformats.org/presentationml/2006/main">
+  <p:cSld>
+    <p:spTree>
+      <p:nvGrpSpPr>
+        <p:cNvPr id="1" name=""/>
+        <p:cNvGrpSpPr/>
+        <p:nvPr/>
+      </p:nvGrpSpPr>
+      <p:grpSpPr>
+        <a:xfrm>
+          <a:off x="0" y="0"/>
+          <a:ext cx="0" cy="0"/>
+          <a:chOff x="0" y="0"/>
+          <a:chExt cx="0" cy="0"/>
+        </a:xfrm>
+      </p:grpSpPr>
+      <p:sp>
+        <p:nvSpPr>
+          <p:cNvPr id="2" name="Título 1">
+            <a:extLst>
+              <a:ext uri="{FF2B5EF4-FFF2-40B4-BE49-F238E27FC236}">
+                <a16:creationId xmlns:a16="http://schemas.microsoft.com/office/drawing/2014/main" id="{9CE36294-D691-83CF-0679-D370F41BB35C}"/>
+              </a:ext>
+            </a:extLst>
+          </p:cNvPr>
+          <p:cNvSpPr>
+            <a:spLocks noGrp="1"/>
+          </p:cNvSpPr>
+          <p:nvPr>
+            <p:ph type="title"/>
+          </p:nvPr>
+        </p:nvSpPr>
+        <p:spPr/>
+        <p:txBody>
+          <a:bodyPr/>
+          <a:lstStyle/>
+          <a:p>
+            <a:r>
+              <a:rPr lang="pt-BR" dirty="0"/>
+              <a:t>Biblioteca player de vídeo</a:t>
+            </a:r>
+          </a:p>
+        </p:txBody>
+      </p:sp>
+      <p:sp>
+        <p:nvSpPr>
+          <p:cNvPr id="3" name="Espaço Reservado para Conteúdo 2">
+            <a:extLst>
+              <a:ext uri="{FF2B5EF4-FFF2-40B4-BE49-F238E27FC236}">
+                <a16:creationId xmlns:a16="http://schemas.microsoft.com/office/drawing/2014/main" id="{EC913C5C-B140-ACC1-F4A8-E9E5818D4770}"/>
+              </a:ext>
+            </a:extLst>
+          </p:cNvPr>
+          <p:cNvSpPr>
+            <a:spLocks noGrp="1"/>
+          </p:cNvSpPr>
+          <p:nvPr>
+            <p:ph idx="1"/>
+          </p:nvPr>
+        </p:nvSpPr>
+        <p:spPr/>
+        <p:txBody>
+          <a:bodyPr/>
+          <a:lstStyle/>
+          <a:p>
+            <a:r>
+              <a:rPr lang="pt-BR" dirty="0" err="1"/>
+              <a:t>npm</a:t>
+            </a:r>
+            <a:r>
+              <a:rPr lang="pt-BR" dirty="0"/>
+              <a:t> i @vime/core @vime/react --force</a:t>
+            </a:r>
+          </a:p>
+        </p:txBody>
+      </p:sp>
+      <p:pic>
+        <p:nvPicPr>
+          <p:cNvPr id="5" name="Imagem 4">
+            <a:extLst>
+              <a:ext uri="{FF2B5EF4-FFF2-40B4-BE49-F238E27FC236}">
+                <a16:creationId xmlns:a16="http://schemas.microsoft.com/office/drawing/2014/main" id="{41560022-0E2B-FB77-3D8B-064F929B480C}"/>
+              </a:ext>
+            </a:extLst>
+          </p:cNvPr>
+          <p:cNvPicPr>
+            <a:picLocks noChangeAspect="1"/>
+          </p:cNvPicPr>
+          <p:nvPr/>
+        </p:nvPicPr>
+        <p:blipFill>
+          <a:blip r:embed="rId2"/>
+          <a:stretch>
+            <a:fillRect/>
+          </a:stretch>
+        </p:blipFill>
+        <p:spPr>
+          <a:xfrm>
+            <a:off x="1645491" y="3902100"/>
+            <a:ext cx="8901016" cy="1164166"/>
+          </a:xfrm>
+          <a:prstGeom prst="rect">
+            <a:avLst/>
+          </a:prstGeom>
+        </p:spPr>
+      </p:pic>
+      <p:pic>
+        <p:nvPicPr>
+          <p:cNvPr id="7" name="Imagem 6">
+            <a:extLst>
+              <a:ext uri="{FF2B5EF4-FFF2-40B4-BE49-F238E27FC236}">
+                <a16:creationId xmlns:a16="http://schemas.microsoft.com/office/drawing/2014/main" id="{CF530CBE-FA03-E3CC-32DF-2ECEBB5BCE07}"/>
+              </a:ext>
+            </a:extLst>
+          </p:cNvPr>
+          <p:cNvPicPr>
+            <a:picLocks noChangeAspect="1"/>
+          </p:cNvPicPr>
+          <p:nvPr/>
+        </p:nvPicPr>
+        <p:blipFill>
+          <a:blip r:embed="rId3"/>
+          <a:stretch>
+            <a:fillRect/>
+          </a:stretch>
+        </p:blipFill>
+        <p:spPr>
+          <a:xfrm>
+            <a:off x="1645492" y="2797788"/>
+            <a:ext cx="8901017" cy="362568"/>
+          </a:xfrm>
+          <a:prstGeom prst="rect">
+            <a:avLst/>
+          </a:prstGeom>
+        </p:spPr>
+      </p:pic>
+      <p:pic>
+        <p:nvPicPr>
+          <p:cNvPr id="9" name="Imagem 8">
+            <a:extLst>
+              <a:ext uri="{FF2B5EF4-FFF2-40B4-BE49-F238E27FC236}">
+                <a16:creationId xmlns:a16="http://schemas.microsoft.com/office/drawing/2014/main" id="{9570FF28-F838-87CC-F567-14E2ED80C211}"/>
+              </a:ext>
+            </a:extLst>
+          </p:cNvPr>
+          <p:cNvPicPr>
+            <a:picLocks noChangeAspect="1"/>
+          </p:cNvPicPr>
+          <p:nvPr/>
+        </p:nvPicPr>
+        <p:blipFill>
+          <a:blip r:embed="rId4"/>
+          <a:stretch>
+            <a:fillRect/>
+          </a:stretch>
+        </p:blipFill>
+        <p:spPr>
+          <a:xfrm>
+            <a:off x="1645491" y="3139147"/>
+            <a:ext cx="6992726" cy="289853"/>
+          </a:xfrm>
+          <a:prstGeom prst="rect">
+            <a:avLst/>
+          </a:prstGeom>
+        </p:spPr>
+      </p:pic>
+    </p:spTree>
+    <p:extLst>
+      <p:ext uri="{BB962C8B-B14F-4D97-AF65-F5344CB8AC3E}">
+        <p14:creationId xmlns:p14="http://schemas.microsoft.com/office/powerpoint/2010/main" val="2076722488"/>
+      </p:ext>
+    </p:extLst>
+  </p:cSld>
+  <p:clrMapOvr>
+    <a:masterClrMapping/>
+  </p:clrMapOvr>
+</p:sld>
+</file>
+
+<file path=ppt/slides/slide35.xml><?xml version="1.0" encoding="utf-8"?>
+<p:sld xmlns:a="http://schemas.openxmlformats.org/drawingml/2006/main" xmlns:r="http://schemas.openxmlformats.org/officeDocument/2006/relationships" xmlns:p="http://schemas.openxmlformats.org/presentationml/2006/main">
+  <p:cSld>
+    <p:spTree>
+      <p:nvGrpSpPr>
+        <p:cNvPr id="1" name=""/>
+        <p:cNvGrpSpPr/>
+        <p:nvPr/>
+      </p:nvGrpSpPr>
+      <p:grpSpPr>
+        <a:xfrm>
+          <a:off x="0" y="0"/>
+          <a:ext cx="0" cy="0"/>
+          <a:chOff x="0" y="0"/>
+          <a:chExt cx="0" cy="0"/>
+        </a:xfrm>
+      </p:grpSpPr>
+      <p:sp>
+        <p:nvSpPr>
+          <p:cNvPr id="2" name="Título 1">
+            <a:extLst>
+              <a:ext uri="{FF2B5EF4-FFF2-40B4-BE49-F238E27FC236}">
+                <a16:creationId xmlns:a16="http://schemas.microsoft.com/office/drawing/2014/main" id="{FF351B11-D555-D8CE-D052-EF3C40F08ACB}"/>
+              </a:ext>
+            </a:extLst>
+          </p:cNvPr>
+          <p:cNvSpPr>
+            <a:spLocks noGrp="1"/>
+          </p:cNvSpPr>
+          <p:nvPr>
+            <p:ph type="title"/>
+          </p:nvPr>
+        </p:nvSpPr>
+        <p:spPr/>
+        <p:txBody>
+          <a:bodyPr/>
+          <a:lstStyle/>
+          <a:p>
+            <a:r>
+              <a:rPr lang="pt-BR" dirty="0"/>
+              <a:t>Biblioteca para roteamento</a:t>
+            </a:r>
+          </a:p>
+        </p:txBody>
+      </p:sp>
+      <p:sp>
+        <p:nvSpPr>
+          <p:cNvPr id="3" name="Espaço Reservado para Conteúdo 2">
+            <a:extLst>
+              <a:ext uri="{FF2B5EF4-FFF2-40B4-BE49-F238E27FC236}">
+                <a16:creationId xmlns:a16="http://schemas.microsoft.com/office/drawing/2014/main" id="{FFE8CB5B-4B9D-4125-CB7A-D827AFADAF36}"/>
+              </a:ext>
+            </a:extLst>
+          </p:cNvPr>
+          <p:cNvSpPr>
+            <a:spLocks noGrp="1"/>
+          </p:cNvSpPr>
+          <p:nvPr>
+            <p:ph idx="1"/>
+          </p:nvPr>
+        </p:nvSpPr>
+        <p:spPr/>
+        <p:txBody>
+          <a:bodyPr/>
+          <a:lstStyle/>
+          <a:p>
+            <a:r>
+              <a:rPr lang="pt-BR" dirty="0" err="1"/>
+              <a:t>npm</a:t>
+            </a:r>
+            <a:r>
+              <a:rPr lang="pt-BR" dirty="0"/>
+              <a:t> i </a:t>
+            </a:r>
+            <a:r>
+              <a:rPr lang="pt-BR" dirty="0" err="1"/>
+              <a:t>react</a:t>
+            </a:r>
+            <a:r>
+              <a:rPr lang="pt-BR" dirty="0"/>
+              <a:t>-</a:t>
+            </a:r>
+            <a:r>
+              <a:rPr lang="pt-BR" dirty="0" err="1"/>
+              <a:t>router</a:t>
+            </a:r>
+            <a:r>
+              <a:rPr lang="pt-BR" dirty="0"/>
+              <a:t>-dom</a:t>
+            </a:r>
+          </a:p>
+        </p:txBody>
+      </p:sp>
+      <p:pic>
+        <p:nvPicPr>
+          <p:cNvPr id="5" name="Imagem 4">
+            <a:extLst>
+              <a:ext uri="{FF2B5EF4-FFF2-40B4-BE49-F238E27FC236}">
+                <a16:creationId xmlns:a16="http://schemas.microsoft.com/office/drawing/2014/main" id="{CF7C73AE-78C0-C9B9-5BB9-6218CBC69DE6}"/>
+              </a:ext>
+            </a:extLst>
+          </p:cNvPr>
+          <p:cNvPicPr>
+            <a:picLocks noChangeAspect="1"/>
+          </p:cNvPicPr>
+          <p:nvPr/>
+        </p:nvPicPr>
+        <p:blipFill>
+          <a:blip r:embed="rId2"/>
+          <a:stretch>
+            <a:fillRect/>
+          </a:stretch>
+        </p:blipFill>
+        <p:spPr>
+          <a:xfrm>
+            <a:off x="2101376" y="2966192"/>
+            <a:ext cx="7989247" cy="2351396"/>
+          </a:xfrm>
+          <a:prstGeom prst="rect">
+            <a:avLst/>
+          </a:prstGeom>
+        </p:spPr>
+      </p:pic>
+      <p:pic>
+        <p:nvPicPr>
+          <p:cNvPr id="7" name="Imagem 6">
+            <a:extLst>
+              <a:ext uri="{FF2B5EF4-FFF2-40B4-BE49-F238E27FC236}">
+                <a16:creationId xmlns:a16="http://schemas.microsoft.com/office/drawing/2014/main" id="{45D3753A-CD55-C214-55E5-568E62B2E0E8}"/>
+              </a:ext>
+            </a:extLst>
+          </p:cNvPr>
+          <p:cNvPicPr>
+            <a:picLocks noChangeAspect="1"/>
+          </p:cNvPicPr>
+          <p:nvPr/>
+        </p:nvPicPr>
+        <p:blipFill>
+          <a:blip r:embed="rId3"/>
+          <a:stretch>
+            <a:fillRect/>
+          </a:stretch>
+        </p:blipFill>
+        <p:spPr>
+          <a:xfrm>
+            <a:off x="2101376" y="5771560"/>
+            <a:ext cx="7989247" cy="512824"/>
+          </a:xfrm>
+          <a:prstGeom prst="rect">
+            <a:avLst/>
+          </a:prstGeom>
+        </p:spPr>
+      </p:pic>
+    </p:spTree>
+    <p:extLst>
+      <p:ext uri="{BB962C8B-B14F-4D97-AF65-F5344CB8AC3E}">
+        <p14:creationId xmlns:p14="http://schemas.microsoft.com/office/powerpoint/2010/main" val="2457091027"/>
+      </p:ext>
+    </p:extLst>
+  </p:cSld>
+  <p:clrMapOvr>
+    <a:masterClrMapping/>
+  </p:clrMapOvr>
+</p:sld>
+</file>
+
+<file path=ppt/slides/slide36.xml><?xml version="1.0" encoding="utf-8"?>
+<p:sld xmlns:a="http://schemas.openxmlformats.org/drawingml/2006/main" xmlns:r="http://schemas.openxmlformats.org/officeDocument/2006/relationships" xmlns:p="http://schemas.openxmlformats.org/presentationml/2006/main">
+  <p:cSld>
+    <p:spTree>
+      <p:nvGrpSpPr>
+        <p:cNvPr id="1" name=""/>
+        <p:cNvGrpSpPr/>
+        <p:nvPr/>
+      </p:nvGrpSpPr>
+      <p:grpSpPr>
+        <a:xfrm>
+          <a:off x="0" y="0"/>
+          <a:ext cx="0" cy="0"/>
+          <a:chOff x="0" y="0"/>
+          <a:chExt cx="0" cy="0"/>
+        </a:xfrm>
+      </p:grpSpPr>
+      <p:sp>
+        <p:nvSpPr>
+          <p:cNvPr id="2" name="Título 1">
+            <a:extLst>
+              <a:ext uri="{FF2B5EF4-FFF2-40B4-BE49-F238E27FC236}">
+                <a16:creationId xmlns:a16="http://schemas.microsoft.com/office/drawing/2014/main" id="{F8F1C522-CF12-16DB-33ED-A676C3C7F4FF}"/>
+              </a:ext>
+            </a:extLst>
+          </p:cNvPr>
+          <p:cNvSpPr>
+            <a:spLocks noGrp="1"/>
+          </p:cNvSpPr>
+          <p:nvPr>
+            <p:ph type="title"/>
+          </p:nvPr>
+        </p:nvSpPr>
+        <p:spPr/>
+        <p:txBody>
+          <a:bodyPr/>
+          <a:lstStyle/>
+          <a:p>
+            <a:endParaRPr lang="pt-BR"/>
+          </a:p>
+        </p:txBody>
+      </p:sp>
+      <p:sp>
+        <p:nvSpPr>
+          <p:cNvPr id="3" name="Espaço Reservado para Conteúdo 2">
+            <a:extLst>
+              <a:ext uri="{FF2B5EF4-FFF2-40B4-BE49-F238E27FC236}">
+                <a16:creationId xmlns:a16="http://schemas.microsoft.com/office/drawing/2014/main" id="{5E414581-7471-11E3-571C-EA7E6137E25B}"/>
+              </a:ext>
+            </a:extLst>
+          </p:cNvPr>
+          <p:cNvSpPr>
+            <a:spLocks noGrp="1"/>
+          </p:cNvSpPr>
+          <p:nvPr>
+            <p:ph idx="1"/>
+          </p:nvPr>
+        </p:nvSpPr>
+        <p:spPr/>
+        <p:txBody>
+          <a:bodyPr/>
+          <a:lstStyle/>
+          <a:p>
+            <a:endParaRPr lang="pt-BR"/>
+          </a:p>
+        </p:txBody>
+      </p:sp>
+    </p:spTree>
+    <p:extLst>
+      <p:ext uri="{BB962C8B-B14F-4D97-AF65-F5344CB8AC3E}">
+        <p14:creationId xmlns:p14="http://schemas.microsoft.com/office/powerpoint/2010/main" val="415666855"/>
       </p:ext>
     </p:extLst>
   </p:cSld>
@@ -7283,6 +7915,123 @@
 </file>
 
 <file path=ppt/slides/slide5.xml><?xml version="1.0" encoding="utf-8"?>
+<p:sld xmlns:a="http://schemas.openxmlformats.org/drawingml/2006/main" xmlns:r="http://schemas.openxmlformats.org/officeDocument/2006/relationships" xmlns:p="http://schemas.openxmlformats.org/presentationml/2006/main">
+  <p:cSld>
+    <p:spTree>
+      <p:nvGrpSpPr>
+        <p:cNvPr id="1" name=""/>
+        <p:cNvGrpSpPr/>
+        <p:nvPr/>
+      </p:nvGrpSpPr>
+      <p:grpSpPr>
+        <a:xfrm>
+          <a:off x="0" y="0"/>
+          <a:ext cx="0" cy="0"/>
+          <a:chOff x="0" y="0"/>
+          <a:chExt cx="0" cy="0"/>
+        </a:xfrm>
+      </p:grpSpPr>
+      <p:sp>
+        <p:nvSpPr>
+          <p:cNvPr id="2" name="Título 1">
+            <a:extLst>
+              <a:ext uri="{FF2B5EF4-FFF2-40B4-BE49-F238E27FC236}">
+                <a16:creationId xmlns:a16="http://schemas.microsoft.com/office/drawing/2014/main" id="{6200977B-DDD4-FBAD-EFC2-B1583563DBA4}"/>
+              </a:ext>
+            </a:extLst>
+          </p:cNvPr>
+          <p:cNvSpPr>
+            <a:spLocks noGrp="1"/>
+          </p:cNvSpPr>
+          <p:nvPr>
+            <p:ph type="title"/>
+          </p:nvPr>
+        </p:nvSpPr>
+        <p:spPr/>
+        <p:txBody>
+          <a:bodyPr/>
+          <a:lstStyle/>
+          <a:p>
+            <a:r>
+              <a:rPr lang="pt-BR" dirty="0"/>
+              <a:t>Rodar</a:t>
+            </a:r>
+          </a:p>
+        </p:txBody>
+      </p:sp>
+      <p:sp>
+        <p:nvSpPr>
+          <p:cNvPr id="3" name="Espaço Reservado para Conteúdo 2">
+            <a:extLst>
+              <a:ext uri="{FF2B5EF4-FFF2-40B4-BE49-F238E27FC236}">
+                <a16:creationId xmlns:a16="http://schemas.microsoft.com/office/drawing/2014/main" id="{21CD9C4D-82AD-5F9C-3558-8222A3461C47}"/>
+              </a:ext>
+            </a:extLst>
+          </p:cNvPr>
+          <p:cNvSpPr>
+            <a:spLocks noGrp="1"/>
+          </p:cNvSpPr>
+          <p:nvPr>
+            <p:ph idx="1"/>
+          </p:nvPr>
+        </p:nvSpPr>
+        <p:spPr/>
+        <p:txBody>
+          <a:bodyPr/>
+          <a:lstStyle/>
+          <a:p>
+            <a:r>
+              <a:rPr lang="pt-BR" dirty="0" err="1"/>
+              <a:t>npm</a:t>
+            </a:r>
+            <a:r>
+              <a:rPr lang="pt-BR" dirty="0"/>
+              <a:t> </a:t>
+            </a:r>
+            <a:r>
+              <a:rPr lang="pt-BR" dirty="0" err="1"/>
+              <a:t>run</a:t>
+            </a:r>
+            <a:r>
+              <a:rPr lang="pt-BR" dirty="0"/>
+              <a:t> </a:t>
+            </a:r>
+            <a:r>
+              <a:rPr lang="pt-BR" dirty="0" err="1"/>
+              <a:t>dev</a:t>
+            </a:r>
+            <a:endParaRPr lang="pt-BR" dirty="0"/>
+          </a:p>
+          <a:p>
+            <a:r>
+              <a:rPr lang="pt-BR" dirty="0"/>
+              <a:t>Parar de rodar:  &lt;</a:t>
+            </a:r>
+            <a:r>
+              <a:rPr lang="pt-BR" dirty="0" err="1"/>
+              <a:t>ctrl</a:t>
+            </a:r>
+            <a:r>
+              <a:rPr lang="pt-BR" dirty="0"/>
+              <a:t>&gt; + c</a:t>
+            </a:r>
+          </a:p>
+        </p:txBody>
+      </p:sp>
+    </p:spTree>
+    <p:extLst>
+      <p:ext uri="{BB962C8B-B14F-4D97-AF65-F5344CB8AC3E}">
+        <p14:creationId xmlns:p14="http://schemas.microsoft.com/office/powerpoint/2010/main" val="3867759283"/>
+      </p:ext>
+    </p:extLst>
+  </p:cSld>
+  <p:clrMapOvr>
+    <a:masterClrMapping/>
+  </p:clrMapOvr>
+</p:sld>
+</file>
+
+<file path=ppt/slides/slide6.xml><?xml version="1.0" encoding="utf-8"?>
 <p:sld xmlns:a="http://schemas.openxmlformats.org/drawingml/2006/main" xmlns:r="http://schemas.openxmlformats.org/officeDocument/2006/relationships" xmlns:p="http://schemas.openxmlformats.org/presentationml/2006/main">
   <p:cSld>
     <p:spTree>
@@ -7446,7 +8195,7 @@
 </p:sld>
 </file>
 
-<file path=ppt/slides/slide6.xml><?xml version="1.0" encoding="utf-8"?>
+<file path=ppt/slides/slide7.xml><?xml version="1.0" encoding="utf-8"?>
 <p:sld xmlns:a="http://schemas.openxmlformats.org/drawingml/2006/main" xmlns:r="http://schemas.openxmlformats.org/officeDocument/2006/relationships" xmlns:p="http://schemas.openxmlformats.org/presentationml/2006/main">
   <p:cSld>
     <p:spTree>
@@ -7599,7 +8348,7 @@
 </p:sld>
 </file>
 
-<file path=ppt/slides/slide7.xml><?xml version="1.0" encoding="utf-8"?>
+<file path=ppt/slides/slide8.xml><?xml version="1.0" encoding="utf-8"?>
 <p:sld xmlns:a="http://schemas.openxmlformats.org/drawingml/2006/main" xmlns:r="http://schemas.openxmlformats.org/officeDocument/2006/relationships" xmlns:p="http://schemas.openxmlformats.org/presentationml/2006/main">
   <p:cSld>
     <p:spTree>
@@ -7693,7 +8442,7 @@
 </p:sld>
 </file>
 
-<file path=ppt/slides/slide8.xml><?xml version="1.0" encoding="utf-8"?>
+<file path=ppt/slides/slide9.xml><?xml version="1.0" encoding="utf-8"?>
 <p:sld xmlns:a="http://schemas.openxmlformats.org/drawingml/2006/main" xmlns:r="http://schemas.openxmlformats.org/officeDocument/2006/relationships" xmlns:p="http://schemas.openxmlformats.org/presentationml/2006/main">
   <p:cSld>
     <p:spTree>
@@ -7808,143 +8557,6 @@
     <p:extLst>
       <p:ext uri="{BB962C8B-B14F-4D97-AF65-F5344CB8AC3E}">
         <p14:creationId xmlns:p14="http://schemas.microsoft.com/office/powerpoint/2010/main" val="753532948"/>
-      </p:ext>
-    </p:extLst>
-  </p:cSld>
-  <p:clrMapOvr>
-    <a:masterClrMapping/>
-  </p:clrMapOvr>
-</p:sld>
-</file>
-
-<file path=ppt/slides/slide9.xml><?xml version="1.0" encoding="utf-8"?>
-<p:sld xmlns:a="http://schemas.openxmlformats.org/drawingml/2006/main" xmlns:r="http://schemas.openxmlformats.org/officeDocument/2006/relationships" xmlns:p="http://schemas.openxmlformats.org/presentationml/2006/main">
-  <p:cSld>
-    <p:spTree>
-      <p:nvGrpSpPr>
-        <p:cNvPr id="1" name=""/>
-        <p:cNvGrpSpPr/>
-        <p:nvPr/>
-      </p:nvGrpSpPr>
-      <p:grpSpPr>
-        <a:xfrm>
-          <a:off x="0" y="0"/>
-          <a:ext cx="0" cy="0"/>
-          <a:chOff x="0" y="0"/>
-          <a:chExt cx="0" cy="0"/>
-        </a:xfrm>
-      </p:grpSpPr>
-      <p:sp>
-        <p:nvSpPr>
-          <p:cNvPr id="2" name="Título 1">
-            <a:extLst>
-              <a:ext uri="{FF2B5EF4-FFF2-40B4-BE49-F238E27FC236}">
-                <a16:creationId xmlns:a16="http://schemas.microsoft.com/office/drawing/2014/main" id="{ED6213E9-706D-A58E-3A0F-65ACB1D2E1FD}"/>
-              </a:ext>
-            </a:extLst>
-          </p:cNvPr>
-          <p:cNvSpPr>
-            <a:spLocks noGrp="1"/>
-          </p:cNvSpPr>
-          <p:nvPr>
-            <p:ph type="title"/>
-          </p:nvPr>
-        </p:nvSpPr>
-        <p:spPr/>
-        <p:txBody>
-          <a:bodyPr/>
-          <a:lstStyle/>
-          <a:p>
-            <a:r>
-              <a:rPr lang="pt-BR" b="1" dirty="0">
-                <a:solidFill>
-                  <a:srgbClr val="78D1E1"/>
-                </a:solidFill>
-                <a:effectLst/>
-                <a:latin typeface="Consolas" panose="020B0609020204030204" pitchFamily="49" charset="0"/>
-              </a:rPr>
-              <a:t>Propriedades - </a:t>
-            </a:r>
-            <a:r>
-              <a:rPr lang="pt-BR" b="1" dirty="0" err="1">
-                <a:solidFill>
-                  <a:srgbClr val="78D1E1"/>
-                </a:solidFill>
-                <a:effectLst/>
-                <a:latin typeface="Consolas" panose="020B0609020204030204" pitchFamily="49" charset="0"/>
-              </a:rPr>
-              <a:t>Desistratular</a:t>
-            </a:r>
-            <a:endParaRPr lang="pt-BR" dirty="0"/>
-          </a:p>
-        </p:txBody>
-      </p:sp>
-      <p:pic>
-        <p:nvPicPr>
-          <p:cNvPr id="5" name="Imagem 4">
-            <a:extLst>
-              <a:ext uri="{FF2B5EF4-FFF2-40B4-BE49-F238E27FC236}">
-                <a16:creationId xmlns:a16="http://schemas.microsoft.com/office/drawing/2014/main" id="{6AD64006-C6CD-89FD-274B-10D3D1BF69BA}"/>
-              </a:ext>
-            </a:extLst>
-          </p:cNvPr>
-          <p:cNvPicPr>
-            <a:picLocks noChangeAspect="1"/>
-          </p:cNvPicPr>
-          <p:nvPr/>
-        </p:nvPicPr>
-        <p:blipFill>
-          <a:blip r:embed="rId2"/>
-          <a:stretch>
-            <a:fillRect/>
-          </a:stretch>
-        </p:blipFill>
-        <p:spPr>
-          <a:xfrm>
-            <a:off x="5457476" y="3401633"/>
-            <a:ext cx="5591955" cy="2676899"/>
-          </a:xfrm>
-          <a:prstGeom prst="rect">
-            <a:avLst/>
-          </a:prstGeom>
-        </p:spPr>
-      </p:pic>
-      <p:pic>
-        <p:nvPicPr>
-          <p:cNvPr id="6" name="Espaço Reservado para Conteúdo 5">
-            <a:extLst>
-              <a:ext uri="{FF2B5EF4-FFF2-40B4-BE49-F238E27FC236}">
-                <a16:creationId xmlns:a16="http://schemas.microsoft.com/office/drawing/2014/main" id="{CA7F3AC4-8B36-11E6-299A-E66356E3D528}"/>
-              </a:ext>
-            </a:extLst>
-          </p:cNvPr>
-          <p:cNvPicPr>
-            <a:picLocks noGrp="1" noChangeAspect="1"/>
-          </p:cNvPicPr>
-          <p:nvPr>
-            <p:ph idx="1"/>
-          </p:nvPr>
-        </p:nvPicPr>
-        <p:blipFill>
-          <a:blip r:embed="rId3"/>
-          <a:stretch>
-            <a:fillRect/>
-          </a:stretch>
-        </p:blipFill>
-        <p:spPr>
-          <a:xfrm>
-            <a:off x="605957" y="1690688"/>
-            <a:ext cx="4725059" cy="3248478"/>
-          </a:xfrm>
-          <a:prstGeom prst="rect">
-            <a:avLst/>
-          </a:prstGeom>
-        </p:spPr>
-      </p:pic>
-    </p:spTree>
-    <p:extLst>
-      <p:ext uri="{BB962C8B-B14F-4D97-AF65-F5344CB8AC3E}">
-        <p14:creationId xmlns:p14="http://schemas.microsoft.com/office/powerpoint/2010/main" val="3417228317"/>
       </p:ext>
     </p:extLst>
   </p:cSld>

</xml_diff>